<commit_message>
new model with concatenation instead of the sum
</commit_message>
<xml_diff>
--- a/models_representation.pptx
+++ b/models_representation.pptx
@@ -9,6 +9,8 @@
     <p:sldId id="257" r:id="rId3"/>
     <p:sldId id="259" r:id="rId4"/>
     <p:sldId id="260" r:id="rId5"/>
+    <p:sldId id="262" r:id="rId6"/>
+    <p:sldId id="261" r:id="rId7"/>
   </p:sldIdLst>
   <p:sldSz cx="12192000" cy="6858000"/>
   <p:notesSz cx="6858000" cy="9144000"/>
@@ -262,7 +264,7 @@
           <a:p>
             <a:fld id="{945283D2-C903-3141-AE1B-7D2BA63A2436}" type="datetimeFigureOut">
               <a:rPr lang="it-IT" smtClean="0"/>
-              <a:t>16/03/24</a:t>
+              <a:t>18/03/24</a:t>
             </a:fld>
             <a:endParaRPr lang="it-IT"/>
           </a:p>
@@ -460,7 +462,7 @@
           <a:p>
             <a:fld id="{945283D2-C903-3141-AE1B-7D2BA63A2436}" type="datetimeFigureOut">
               <a:rPr lang="it-IT" smtClean="0"/>
-              <a:t>16/03/24</a:t>
+              <a:t>18/03/24</a:t>
             </a:fld>
             <a:endParaRPr lang="it-IT"/>
           </a:p>
@@ -668,7 +670,7 @@
           <a:p>
             <a:fld id="{945283D2-C903-3141-AE1B-7D2BA63A2436}" type="datetimeFigureOut">
               <a:rPr lang="it-IT" smtClean="0"/>
-              <a:t>16/03/24</a:t>
+              <a:t>18/03/24</a:t>
             </a:fld>
             <a:endParaRPr lang="it-IT"/>
           </a:p>
@@ -866,7 +868,7 @@
           <a:p>
             <a:fld id="{945283D2-C903-3141-AE1B-7D2BA63A2436}" type="datetimeFigureOut">
               <a:rPr lang="it-IT" smtClean="0"/>
-              <a:t>16/03/24</a:t>
+              <a:t>18/03/24</a:t>
             </a:fld>
             <a:endParaRPr lang="it-IT"/>
           </a:p>
@@ -1141,7 +1143,7 @@
           <a:p>
             <a:fld id="{945283D2-C903-3141-AE1B-7D2BA63A2436}" type="datetimeFigureOut">
               <a:rPr lang="it-IT" smtClean="0"/>
-              <a:t>16/03/24</a:t>
+              <a:t>18/03/24</a:t>
             </a:fld>
             <a:endParaRPr lang="it-IT"/>
           </a:p>
@@ -1406,7 +1408,7 @@
           <a:p>
             <a:fld id="{945283D2-C903-3141-AE1B-7D2BA63A2436}" type="datetimeFigureOut">
               <a:rPr lang="it-IT" smtClean="0"/>
-              <a:t>16/03/24</a:t>
+              <a:t>18/03/24</a:t>
             </a:fld>
             <a:endParaRPr lang="it-IT"/>
           </a:p>
@@ -1818,7 +1820,7 @@
           <a:p>
             <a:fld id="{945283D2-C903-3141-AE1B-7D2BA63A2436}" type="datetimeFigureOut">
               <a:rPr lang="it-IT" smtClean="0"/>
-              <a:t>16/03/24</a:t>
+              <a:t>18/03/24</a:t>
             </a:fld>
             <a:endParaRPr lang="it-IT"/>
           </a:p>
@@ -1959,7 +1961,7 @@
           <a:p>
             <a:fld id="{945283D2-C903-3141-AE1B-7D2BA63A2436}" type="datetimeFigureOut">
               <a:rPr lang="it-IT" smtClean="0"/>
-              <a:t>16/03/24</a:t>
+              <a:t>18/03/24</a:t>
             </a:fld>
             <a:endParaRPr lang="it-IT"/>
           </a:p>
@@ -2072,7 +2074,7 @@
           <a:p>
             <a:fld id="{945283D2-C903-3141-AE1B-7D2BA63A2436}" type="datetimeFigureOut">
               <a:rPr lang="it-IT" smtClean="0"/>
-              <a:t>16/03/24</a:t>
+              <a:t>18/03/24</a:t>
             </a:fld>
             <a:endParaRPr lang="it-IT"/>
           </a:p>
@@ -2383,7 +2385,7 @@
           <a:p>
             <a:fld id="{945283D2-C903-3141-AE1B-7D2BA63A2436}" type="datetimeFigureOut">
               <a:rPr lang="it-IT" smtClean="0"/>
-              <a:t>16/03/24</a:t>
+              <a:t>18/03/24</a:t>
             </a:fld>
             <a:endParaRPr lang="it-IT"/>
           </a:p>
@@ -2671,7 +2673,7 @@
           <a:p>
             <a:fld id="{945283D2-C903-3141-AE1B-7D2BA63A2436}" type="datetimeFigureOut">
               <a:rPr lang="it-IT" smtClean="0"/>
-              <a:t>16/03/24</a:t>
+              <a:t>18/03/24</a:t>
             </a:fld>
             <a:endParaRPr lang="it-IT"/>
           </a:p>
@@ -2912,7 +2914,7 @@
           <a:p>
             <a:fld id="{945283D2-C903-3141-AE1B-7D2BA63A2436}" type="datetimeFigureOut">
               <a:rPr lang="it-IT" smtClean="0"/>
-              <a:t>16/03/24</a:t>
+              <a:t>18/03/24</a:t>
             </a:fld>
             <a:endParaRPr lang="it-IT"/>
           </a:p>
@@ -12569,6 +12571,4722 @@
     <p:extLst>
       <p:ext uri="{BB962C8B-B14F-4D97-AF65-F5344CB8AC3E}">
         <p14:creationId xmlns:p14="http://schemas.microsoft.com/office/powerpoint/2010/main" val="2346984747"/>
+      </p:ext>
+    </p:extLst>
+  </p:cSld>
+  <p:clrMapOvr>
+    <a:masterClrMapping/>
+  </p:clrMapOvr>
+</p:sld>
+</file>
+
+<file path=ppt/slides/slide5.xml><?xml version="1.0" encoding="utf-8"?>
+<p:sld xmlns:a="http://schemas.openxmlformats.org/drawingml/2006/main" xmlns:r="http://schemas.openxmlformats.org/officeDocument/2006/relationships" xmlns:p="http://schemas.openxmlformats.org/presentationml/2006/main">
+  <p:cSld>
+    <p:spTree>
+      <p:nvGrpSpPr>
+        <p:cNvPr id="1" name=""/>
+        <p:cNvGrpSpPr/>
+        <p:nvPr/>
+      </p:nvGrpSpPr>
+      <p:grpSpPr>
+        <a:xfrm>
+          <a:off x="0" y="0"/>
+          <a:ext cx="0" cy="0"/>
+          <a:chOff x="0" y="0"/>
+          <a:chExt cx="0" cy="0"/>
+        </a:xfrm>
+      </p:grpSpPr>
+      <p:sp>
+        <p:nvSpPr>
+          <p:cNvPr id="2" name="Titolo 1">
+            <a:extLst>
+              <a:ext uri="{FF2B5EF4-FFF2-40B4-BE49-F238E27FC236}">
+                <a16:creationId xmlns:a16="http://schemas.microsoft.com/office/drawing/2014/main" id="{564C5D72-7CA8-B368-4244-34147DF00AE9}"/>
+              </a:ext>
+            </a:extLst>
+          </p:cNvPr>
+          <p:cNvSpPr>
+            <a:spLocks noGrp="1"/>
+          </p:cNvSpPr>
+          <p:nvPr>
+            <p:ph type="ctrTitle"/>
+          </p:nvPr>
+        </p:nvSpPr>
+        <p:spPr/>
+        <p:txBody>
+          <a:bodyPr/>
+          <a:lstStyle/>
+          <a:p>
+            <a:r>
+              <a:rPr lang="it-IT" dirty="0" err="1"/>
+              <a:t>UNet</a:t>
+            </a:r>
+            <a:r>
+              <a:rPr lang="it-IT" dirty="0"/>
+              <a:t> for super-</a:t>
+            </a:r>
+            <a:r>
+              <a:rPr lang="it-IT" dirty="0" err="1"/>
+              <a:t>resolution</a:t>
+            </a:r>
+            <a:r>
+              <a:rPr lang="it-IT" dirty="0"/>
+              <a:t> </a:t>
+            </a:r>
+            <a:r>
+              <a:rPr lang="it-IT" dirty="0" err="1"/>
+              <a:t>concatenation</a:t>
+            </a:r>
+            <a:endParaRPr lang="it-IT" dirty="0"/>
+          </a:p>
+        </p:txBody>
+      </p:sp>
+    </p:spTree>
+    <p:extLst>
+      <p:ext uri="{BB962C8B-B14F-4D97-AF65-F5344CB8AC3E}">
+        <p14:creationId xmlns:p14="http://schemas.microsoft.com/office/powerpoint/2010/main" val="4219613783"/>
+      </p:ext>
+    </p:extLst>
+  </p:cSld>
+  <p:clrMapOvr>
+    <a:masterClrMapping/>
+  </p:clrMapOvr>
+</p:sld>
+</file>
+
+<file path=ppt/slides/slide6.xml><?xml version="1.0" encoding="utf-8"?>
+<p:sld xmlns:a="http://schemas.openxmlformats.org/drawingml/2006/main" xmlns:r="http://schemas.openxmlformats.org/officeDocument/2006/relationships" xmlns:p="http://schemas.openxmlformats.org/presentationml/2006/main">
+  <p:cSld>
+    <p:spTree>
+      <p:nvGrpSpPr>
+        <p:cNvPr id="1" name=""/>
+        <p:cNvGrpSpPr/>
+        <p:nvPr/>
+      </p:nvGrpSpPr>
+      <p:grpSpPr>
+        <a:xfrm>
+          <a:off x="0" y="0"/>
+          <a:ext cx="0" cy="0"/>
+          <a:chOff x="0" y="0"/>
+          <a:chExt cx="0" cy="0"/>
+        </a:xfrm>
+      </p:grpSpPr>
+      <p:sp>
+        <p:nvSpPr>
+          <p:cNvPr id="215" name="Rettangolo 214">
+            <a:extLst>
+              <a:ext uri="{FF2B5EF4-FFF2-40B4-BE49-F238E27FC236}">
+                <a16:creationId xmlns:a16="http://schemas.microsoft.com/office/drawing/2014/main" id="{ED3B203F-5EF1-3CAB-7198-0B8C45994284}"/>
+              </a:ext>
+            </a:extLst>
+          </p:cNvPr>
+          <p:cNvSpPr/>
+          <p:nvPr/>
+        </p:nvSpPr>
+        <p:spPr>
+          <a:xfrm>
+            <a:off x="6729152" y="2071002"/>
+            <a:ext cx="4099718" cy="2374566"/>
+          </a:xfrm>
+          <a:prstGeom prst="rect">
+            <a:avLst/>
+          </a:prstGeom>
+          <a:solidFill>
+            <a:schemeClr val="accent4">
+              <a:lumMod val="40000"/>
+              <a:lumOff val="60000"/>
+            </a:schemeClr>
+          </a:solidFill>
+        </p:spPr>
+        <p:style>
+          <a:lnRef idx="2">
+            <a:schemeClr val="accent1">
+              <a:shade val="15000"/>
+            </a:schemeClr>
+          </a:lnRef>
+          <a:fillRef idx="1">
+            <a:schemeClr val="accent1"/>
+          </a:fillRef>
+          <a:effectRef idx="0">
+            <a:schemeClr val="accent1"/>
+          </a:effectRef>
+          <a:fontRef idx="minor">
+            <a:schemeClr val="lt1"/>
+          </a:fontRef>
+        </p:style>
+        <p:txBody>
+          <a:bodyPr rtlCol="0" anchor="ctr"/>
+          <a:lstStyle/>
+          <a:p>
+            <a:pPr algn="ctr"/>
+            <a:endParaRPr lang="it-IT" dirty="0"/>
+          </a:p>
+        </p:txBody>
+      </p:sp>
+      <p:pic>
+        <p:nvPicPr>
+          <p:cNvPr id="5" name="Immagine 4" descr="Immagine che contiene nero, design&#10;&#10;Descrizione generata automaticamente">
+            <a:extLst>
+              <a:ext uri="{FF2B5EF4-FFF2-40B4-BE49-F238E27FC236}">
+                <a16:creationId xmlns:a16="http://schemas.microsoft.com/office/drawing/2014/main" id="{CFF8E1BC-D450-9E06-46D1-602B9899AF45}"/>
+              </a:ext>
+            </a:extLst>
+          </p:cNvPr>
+          <p:cNvPicPr>
+            <a:picLocks noChangeAspect="1"/>
+          </p:cNvPicPr>
+          <p:nvPr/>
+        </p:nvPicPr>
+        <p:blipFill>
+          <a:blip r:embed="rId2"/>
+          <a:stretch>
+            <a:fillRect/>
+          </a:stretch>
+        </p:blipFill>
+        <p:spPr>
+          <a:xfrm>
+            <a:off x="8728" y="6272250"/>
+            <a:ext cx="584200" cy="585750"/>
+          </a:xfrm>
+          <a:prstGeom prst="rect">
+            <a:avLst/>
+          </a:prstGeom>
+        </p:spPr>
+      </p:pic>
+      <p:cxnSp>
+        <p:nvCxnSpPr>
+          <p:cNvPr id="118" name="Connettore 2 117">
+            <a:extLst>
+              <a:ext uri="{FF2B5EF4-FFF2-40B4-BE49-F238E27FC236}">
+                <a16:creationId xmlns:a16="http://schemas.microsoft.com/office/drawing/2014/main" id="{8F0F750E-F5A9-9EB3-54B0-3AA725237285}"/>
+              </a:ext>
+            </a:extLst>
+          </p:cNvPr>
+          <p:cNvCxnSpPr>
+            <a:cxnSpLocks/>
+            <a:endCxn id="138" idx="2"/>
+          </p:cNvCxnSpPr>
+          <p:nvPr/>
+        </p:nvCxnSpPr>
+        <p:spPr>
+          <a:xfrm>
+            <a:off x="5015323" y="3258285"/>
+            <a:ext cx="458990" cy="4052"/>
+          </a:xfrm>
+          <a:prstGeom prst="straightConnector1">
+            <a:avLst/>
+          </a:prstGeom>
+          <a:ln w="25400" cmpd="sng">
+            <a:tailEnd type="triangle"/>
+          </a:ln>
+        </p:spPr>
+        <p:style>
+          <a:lnRef idx="2">
+            <a:schemeClr val="dk1"/>
+          </a:lnRef>
+          <a:fillRef idx="0">
+            <a:schemeClr val="dk1"/>
+          </a:fillRef>
+          <a:effectRef idx="1">
+            <a:schemeClr val="dk1"/>
+          </a:effectRef>
+          <a:fontRef idx="minor">
+            <a:schemeClr val="tx1"/>
+          </a:fontRef>
+        </p:style>
+      </p:cxnSp>
+      <p:cxnSp>
+        <p:nvCxnSpPr>
+          <p:cNvPr id="131" name="Connettore 2 130">
+            <a:extLst>
+              <a:ext uri="{FF2B5EF4-FFF2-40B4-BE49-F238E27FC236}">
+                <a16:creationId xmlns:a16="http://schemas.microsoft.com/office/drawing/2014/main" id="{CDC01E46-CBF2-06A5-3C2E-35863A69E5F3}"/>
+              </a:ext>
+            </a:extLst>
+          </p:cNvPr>
+          <p:cNvCxnSpPr>
+            <a:cxnSpLocks/>
+          </p:cNvCxnSpPr>
+          <p:nvPr/>
+        </p:nvCxnSpPr>
+        <p:spPr>
+          <a:xfrm flipV="1">
+            <a:off x="3763592" y="1351883"/>
+            <a:ext cx="8526280" cy="7605"/>
+          </a:xfrm>
+          <a:prstGeom prst="straightConnector1">
+            <a:avLst/>
+          </a:prstGeom>
+          <a:ln w="25400" cmpd="sng">
+            <a:tailEnd type="triangle"/>
+          </a:ln>
+        </p:spPr>
+        <p:style>
+          <a:lnRef idx="2">
+            <a:schemeClr val="dk1"/>
+          </a:lnRef>
+          <a:fillRef idx="0">
+            <a:schemeClr val="dk1"/>
+          </a:fillRef>
+          <a:effectRef idx="1">
+            <a:schemeClr val="dk1"/>
+          </a:effectRef>
+          <a:fontRef idx="minor">
+            <a:schemeClr val="tx1"/>
+          </a:fontRef>
+        </p:style>
+      </p:cxnSp>
+      <p:sp>
+        <p:nvSpPr>
+          <p:cNvPr id="138" name="Rettangolo 137">
+            <a:extLst>
+              <a:ext uri="{FF2B5EF4-FFF2-40B4-BE49-F238E27FC236}">
+                <a16:creationId xmlns:a16="http://schemas.microsoft.com/office/drawing/2014/main" id="{E19BF6A9-DBCE-C4C1-F87F-64DF907D48A1}"/>
+              </a:ext>
+            </a:extLst>
+          </p:cNvPr>
+          <p:cNvSpPr/>
+          <p:nvPr/>
+        </p:nvSpPr>
+        <p:spPr>
+          <a:xfrm rot="5400000">
+            <a:off x="4645934" y="3145636"/>
+            <a:ext cx="1890159" cy="233401"/>
+          </a:xfrm>
+          <a:prstGeom prst="rect">
+            <a:avLst/>
+          </a:prstGeom>
+          <a:solidFill>
+            <a:schemeClr val="bg1">
+              <a:lumMod val="75000"/>
+            </a:schemeClr>
+          </a:solidFill>
+        </p:spPr>
+        <p:style>
+          <a:lnRef idx="2">
+            <a:schemeClr val="accent1">
+              <a:shade val="15000"/>
+            </a:schemeClr>
+          </a:lnRef>
+          <a:fillRef idx="1">
+            <a:schemeClr val="accent1"/>
+          </a:fillRef>
+          <a:effectRef idx="0">
+            <a:schemeClr val="accent1"/>
+          </a:effectRef>
+          <a:fontRef idx="minor">
+            <a:schemeClr val="lt1"/>
+          </a:fontRef>
+        </p:style>
+        <p:txBody>
+          <a:bodyPr rtlCol="0" anchor="ctr"/>
+          <a:lstStyle/>
+          <a:p>
+            <a:pPr algn="ctr"/>
+            <a:r>
+              <a:rPr lang="it-IT" dirty="0">
+                <a:solidFill>
+                  <a:schemeClr val="tx1"/>
+                </a:solidFill>
+              </a:rPr>
+              <a:t>ENCODER</a:t>
+            </a:r>
+          </a:p>
+        </p:txBody>
+      </p:sp>
+      <p:cxnSp>
+        <p:nvCxnSpPr>
+          <p:cNvPr id="139" name="Connettore 2 138">
+            <a:extLst>
+              <a:ext uri="{FF2B5EF4-FFF2-40B4-BE49-F238E27FC236}">
+                <a16:creationId xmlns:a16="http://schemas.microsoft.com/office/drawing/2014/main" id="{F5C31AE4-4D09-C017-B524-EF18C8FF7FF6}"/>
+              </a:ext>
+            </a:extLst>
+          </p:cNvPr>
+          <p:cNvCxnSpPr>
+            <a:cxnSpLocks/>
+          </p:cNvCxnSpPr>
+          <p:nvPr/>
+        </p:nvCxnSpPr>
+        <p:spPr>
+          <a:xfrm>
+            <a:off x="5707031" y="3302661"/>
+            <a:ext cx="168464" cy="0"/>
+          </a:xfrm>
+          <a:prstGeom prst="straightConnector1">
+            <a:avLst/>
+          </a:prstGeom>
+          <a:ln w="25400" cmpd="sng">
+            <a:tailEnd type="triangle"/>
+          </a:ln>
+        </p:spPr>
+        <p:style>
+          <a:lnRef idx="2">
+            <a:schemeClr val="dk1"/>
+          </a:lnRef>
+          <a:fillRef idx="0">
+            <a:schemeClr val="dk1"/>
+          </a:fillRef>
+          <a:effectRef idx="1">
+            <a:schemeClr val="dk1"/>
+          </a:effectRef>
+          <a:fontRef idx="minor">
+            <a:schemeClr val="tx1"/>
+          </a:fontRef>
+        </p:style>
+      </p:cxnSp>
+      <p:sp>
+        <p:nvSpPr>
+          <p:cNvPr id="140" name="Rettangolo 139">
+            <a:extLst>
+              <a:ext uri="{FF2B5EF4-FFF2-40B4-BE49-F238E27FC236}">
+                <a16:creationId xmlns:a16="http://schemas.microsoft.com/office/drawing/2014/main" id="{BE9011BB-372D-BC05-D16C-9A55A08371E9}"/>
+              </a:ext>
+            </a:extLst>
+          </p:cNvPr>
+          <p:cNvSpPr/>
+          <p:nvPr/>
+        </p:nvSpPr>
+        <p:spPr>
+          <a:xfrm rot="5400000">
+            <a:off x="5063026" y="3139305"/>
+            <a:ext cx="1890159" cy="233401"/>
+          </a:xfrm>
+          <a:prstGeom prst="rect">
+            <a:avLst/>
+          </a:prstGeom>
+          <a:solidFill>
+            <a:schemeClr val="bg1">
+              <a:lumMod val="75000"/>
+            </a:schemeClr>
+          </a:solidFill>
+        </p:spPr>
+        <p:style>
+          <a:lnRef idx="2">
+            <a:schemeClr val="accent1">
+              <a:shade val="15000"/>
+            </a:schemeClr>
+          </a:lnRef>
+          <a:fillRef idx="1">
+            <a:schemeClr val="accent1"/>
+          </a:fillRef>
+          <a:effectRef idx="0">
+            <a:schemeClr val="accent1"/>
+          </a:effectRef>
+          <a:fontRef idx="minor">
+            <a:schemeClr val="lt1"/>
+          </a:fontRef>
+        </p:style>
+        <p:txBody>
+          <a:bodyPr rtlCol="0" anchor="ctr"/>
+          <a:lstStyle/>
+          <a:p>
+            <a:pPr algn="ctr"/>
+            <a:r>
+              <a:rPr lang="it-IT" dirty="0">
+                <a:solidFill>
+                  <a:schemeClr val="tx1"/>
+                </a:solidFill>
+              </a:rPr>
+              <a:t>ENCODER</a:t>
+            </a:r>
+          </a:p>
+        </p:txBody>
+      </p:sp>
+      <p:cxnSp>
+        <p:nvCxnSpPr>
+          <p:cNvPr id="143" name="Connettore 2 142">
+            <a:extLst>
+              <a:ext uri="{FF2B5EF4-FFF2-40B4-BE49-F238E27FC236}">
+                <a16:creationId xmlns:a16="http://schemas.microsoft.com/office/drawing/2014/main" id="{011C7988-63A2-68EB-A262-08BF31A21F4C}"/>
+              </a:ext>
+            </a:extLst>
+          </p:cNvPr>
+          <p:cNvCxnSpPr>
+            <a:cxnSpLocks/>
+          </p:cNvCxnSpPr>
+          <p:nvPr/>
+        </p:nvCxnSpPr>
+        <p:spPr>
+          <a:xfrm flipH="1">
+            <a:off x="5563676" y="1343626"/>
+            <a:ext cx="14233" cy="964951"/>
+          </a:xfrm>
+          <a:prstGeom prst="straightConnector1">
+            <a:avLst/>
+          </a:prstGeom>
+          <a:ln w="25400" cmpd="sng">
+            <a:tailEnd type="triangle"/>
+          </a:ln>
+        </p:spPr>
+        <p:style>
+          <a:lnRef idx="2">
+            <a:schemeClr val="dk1"/>
+          </a:lnRef>
+          <a:fillRef idx="0">
+            <a:schemeClr val="dk1"/>
+          </a:fillRef>
+          <a:effectRef idx="1">
+            <a:schemeClr val="dk1"/>
+          </a:effectRef>
+          <a:fontRef idx="minor">
+            <a:schemeClr val="tx1"/>
+          </a:fontRef>
+        </p:style>
+      </p:cxnSp>
+      <p:cxnSp>
+        <p:nvCxnSpPr>
+          <p:cNvPr id="144" name="Connettore 2 143">
+            <a:extLst>
+              <a:ext uri="{FF2B5EF4-FFF2-40B4-BE49-F238E27FC236}">
+                <a16:creationId xmlns:a16="http://schemas.microsoft.com/office/drawing/2014/main" id="{0DFF4473-8A77-CC8F-B8D4-1AFE0447F791}"/>
+              </a:ext>
+            </a:extLst>
+          </p:cNvPr>
+          <p:cNvCxnSpPr>
+            <a:cxnSpLocks/>
+          </p:cNvCxnSpPr>
+          <p:nvPr/>
+        </p:nvCxnSpPr>
+        <p:spPr>
+          <a:xfrm>
+            <a:off x="6002942" y="1343626"/>
+            <a:ext cx="4337" cy="963247"/>
+          </a:xfrm>
+          <a:prstGeom prst="straightConnector1">
+            <a:avLst/>
+          </a:prstGeom>
+          <a:ln w="25400" cmpd="sng">
+            <a:tailEnd type="triangle"/>
+          </a:ln>
+        </p:spPr>
+        <p:style>
+          <a:lnRef idx="2">
+            <a:schemeClr val="dk1"/>
+          </a:lnRef>
+          <a:fillRef idx="0">
+            <a:schemeClr val="dk1"/>
+          </a:fillRef>
+          <a:effectRef idx="1">
+            <a:schemeClr val="dk1"/>
+          </a:effectRef>
+          <a:fontRef idx="minor">
+            <a:schemeClr val="tx1"/>
+          </a:fontRef>
+        </p:style>
+      </p:cxnSp>
+      <p:sp>
+        <p:nvSpPr>
+          <p:cNvPr id="147" name="Rettangolo 146">
+            <a:extLst>
+              <a:ext uri="{FF2B5EF4-FFF2-40B4-BE49-F238E27FC236}">
+                <a16:creationId xmlns:a16="http://schemas.microsoft.com/office/drawing/2014/main" id="{79CE8B12-81E4-310E-2CD3-746145186C1D}"/>
+              </a:ext>
+            </a:extLst>
+          </p:cNvPr>
+          <p:cNvSpPr/>
+          <p:nvPr/>
+        </p:nvSpPr>
+        <p:spPr>
+          <a:xfrm>
+            <a:off x="6828539" y="2274065"/>
+            <a:ext cx="792575" cy="1830022"/>
+          </a:xfrm>
+          <a:prstGeom prst="rect">
+            <a:avLst/>
+          </a:prstGeom>
+          <a:solidFill>
+            <a:schemeClr val="accent2">
+              <a:lumMod val="60000"/>
+              <a:lumOff val="40000"/>
+            </a:schemeClr>
+          </a:solidFill>
+        </p:spPr>
+        <p:style>
+          <a:lnRef idx="2">
+            <a:schemeClr val="accent1">
+              <a:shade val="15000"/>
+            </a:schemeClr>
+          </a:lnRef>
+          <a:fillRef idx="1">
+            <a:schemeClr val="accent1"/>
+          </a:fillRef>
+          <a:effectRef idx="0">
+            <a:schemeClr val="accent1"/>
+          </a:effectRef>
+          <a:fontRef idx="minor">
+            <a:schemeClr val="lt1"/>
+          </a:fontRef>
+        </p:style>
+        <p:txBody>
+          <a:bodyPr rtlCol="0" anchor="ctr"/>
+          <a:lstStyle/>
+          <a:p>
+            <a:pPr algn="ctr"/>
+            <a:endParaRPr lang="it-IT"/>
+          </a:p>
+        </p:txBody>
+      </p:sp>
+      <p:sp>
+        <p:nvSpPr>
+          <p:cNvPr id="148" name="Rettangolo 147">
+            <a:extLst>
+              <a:ext uri="{FF2B5EF4-FFF2-40B4-BE49-F238E27FC236}">
+                <a16:creationId xmlns:a16="http://schemas.microsoft.com/office/drawing/2014/main" id="{59C092EB-1C6F-BE34-39D7-16BD0BF68ED4}"/>
+              </a:ext>
+            </a:extLst>
+          </p:cNvPr>
+          <p:cNvSpPr/>
+          <p:nvPr/>
+        </p:nvSpPr>
+        <p:spPr>
+          <a:xfrm rot="5400000">
+            <a:off x="6615080" y="2487522"/>
+            <a:ext cx="733013" cy="306098"/>
+          </a:xfrm>
+          <a:prstGeom prst="rect">
+            <a:avLst/>
+          </a:prstGeom>
+          <a:solidFill>
+            <a:schemeClr val="accent2"/>
+          </a:solidFill>
+        </p:spPr>
+        <p:style>
+          <a:lnRef idx="2">
+            <a:schemeClr val="accent1">
+              <a:shade val="15000"/>
+            </a:schemeClr>
+          </a:lnRef>
+          <a:fillRef idx="1">
+            <a:schemeClr val="accent1"/>
+          </a:fillRef>
+          <a:effectRef idx="0">
+            <a:schemeClr val="accent1"/>
+          </a:effectRef>
+          <a:fontRef idx="minor">
+            <a:schemeClr val="lt1"/>
+          </a:fontRef>
+        </p:style>
+        <p:txBody>
+          <a:bodyPr rtlCol="0" anchor="ctr"/>
+          <a:lstStyle/>
+          <a:p>
+            <a:pPr algn="ctr"/>
+            <a:r>
+              <a:rPr lang="it-IT" sz="1100" b="1" dirty="0">
+                <a:solidFill>
+                  <a:schemeClr val="tx1"/>
+                </a:solidFill>
+              </a:rPr>
+              <a:t>Conv2D</a:t>
+            </a:r>
+          </a:p>
+        </p:txBody>
+      </p:sp>
+      <p:sp>
+        <p:nvSpPr>
+          <p:cNvPr id="149" name="Rettangolo 148">
+            <a:extLst>
+              <a:ext uri="{FF2B5EF4-FFF2-40B4-BE49-F238E27FC236}">
+                <a16:creationId xmlns:a16="http://schemas.microsoft.com/office/drawing/2014/main" id="{562AAD9D-11AD-21AD-4975-91B6C78BC93A}"/>
+              </a:ext>
+            </a:extLst>
+          </p:cNvPr>
+          <p:cNvSpPr/>
+          <p:nvPr/>
+        </p:nvSpPr>
+        <p:spPr>
+          <a:xfrm rot="5400000">
+            <a:off x="6877789" y="3100373"/>
+            <a:ext cx="733015" cy="393394"/>
+          </a:xfrm>
+          <a:prstGeom prst="rect">
+            <a:avLst/>
+          </a:prstGeom>
+          <a:solidFill>
+            <a:srgbClr val="0096FF"/>
+          </a:solidFill>
+        </p:spPr>
+        <p:style>
+          <a:lnRef idx="2">
+            <a:schemeClr val="accent1">
+              <a:shade val="15000"/>
+            </a:schemeClr>
+          </a:lnRef>
+          <a:fillRef idx="1">
+            <a:schemeClr val="accent1"/>
+          </a:fillRef>
+          <a:effectRef idx="0">
+            <a:schemeClr val="accent1"/>
+          </a:effectRef>
+          <a:fontRef idx="minor">
+            <a:schemeClr val="lt1"/>
+          </a:fontRef>
+        </p:style>
+        <p:txBody>
+          <a:bodyPr rtlCol="0" anchor="ctr"/>
+          <a:lstStyle/>
+          <a:p>
+            <a:pPr algn="ctr"/>
+            <a:r>
+              <a:rPr lang="it-IT" sz="1300" b="1" dirty="0">
+                <a:solidFill>
+                  <a:schemeClr val="tx1"/>
+                </a:solidFill>
+              </a:rPr>
+              <a:t>Batch </a:t>
+            </a:r>
+            <a:r>
+              <a:rPr lang="it-IT" sz="1300" b="1" dirty="0" err="1">
+                <a:solidFill>
+                  <a:schemeClr val="tx1"/>
+                </a:solidFill>
+              </a:rPr>
+              <a:t>Nrom</a:t>
+            </a:r>
+            <a:endParaRPr lang="it-IT" sz="1300" b="1" dirty="0">
+              <a:solidFill>
+                <a:schemeClr val="tx1"/>
+              </a:solidFill>
+            </a:endParaRPr>
+          </a:p>
+        </p:txBody>
+      </p:sp>
+      <p:sp>
+        <p:nvSpPr>
+          <p:cNvPr id="150" name="Rettangolo 149">
+            <a:extLst>
+              <a:ext uri="{FF2B5EF4-FFF2-40B4-BE49-F238E27FC236}">
+                <a16:creationId xmlns:a16="http://schemas.microsoft.com/office/drawing/2014/main" id="{A76A653B-D0F0-A38A-E14F-887C56D19967}"/>
+              </a:ext>
+            </a:extLst>
+          </p:cNvPr>
+          <p:cNvSpPr/>
+          <p:nvPr/>
+        </p:nvSpPr>
+        <p:spPr>
+          <a:xfrm rot="5400000">
+            <a:off x="7223729" y="3698356"/>
+            <a:ext cx="488672" cy="306098"/>
+          </a:xfrm>
+          <a:prstGeom prst="rect">
+            <a:avLst/>
+          </a:prstGeom>
+          <a:solidFill>
+            <a:srgbClr val="FFFD78"/>
+          </a:solidFill>
+        </p:spPr>
+        <p:style>
+          <a:lnRef idx="2">
+            <a:schemeClr val="accent1">
+              <a:shade val="15000"/>
+            </a:schemeClr>
+          </a:lnRef>
+          <a:fillRef idx="1">
+            <a:schemeClr val="accent1"/>
+          </a:fillRef>
+          <a:effectRef idx="0">
+            <a:schemeClr val="accent1"/>
+          </a:effectRef>
+          <a:fontRef idx="minor">
+            <a:schemeClr val="lt1"/>
+          </a:fontRef>
+        </p:style>
+        <p:txBody>
+          <a:bodyPr rtlCol="0" anchor="ctr"/>
+          <a:lstStyle/>
+          <a:p>
+            <a:pPr algn="ctr"/>
+            <a:r>
+              <a:rPr lang="it-IT" sz="1100" b="1" dirty="0" err="1">
+                <a:solidFill>
+                  <a:schemeClr val="tx1"/>
+                </a:solidFill>
+              </a:rPr>
+              <a:t>Relu</a:t>
+            </a:r>
+            <a:endParaRPr lang="it-IT" sz="1100" b="1" dirty="0">
+              <a:solidFill>
+                <a:schemeClr val="tx1"/>
+              </a:solidFill>
+            </a:endParaRPr>
+          </a:p>
+        </p:txBody>
+      </p:sp>
+      <p:cxnSp>
+        <p:nvCxnSpPr>
+          <p:cNvPr id="151" name="Connettore 2 150">
+            <a:extLst>
+              <a:ext uri="{FF2B5EF4-FFF2-40B4-BE49-F238E27FC236}">
+                <a16:creationId xmlns:a16="http://schemas.microsoft.com/office/drawing/2014/main" id="{B0194EA8-AE5B-078E-75D6-4A4244B57428}"/>
+              </a:ext>
+            </a:extLst>
+          </p:cNvPr>
+          <p:cNvCxnSpPr>
+            <a:cxnSpLocks/>
+            <a:stCxn id="147" idx="3"/>
+            <a:endCxn id="159" idx="2"/>
+          </p:cNvCxnSpPr>
+          <p:nvPr/>
+        </p:nvCxnSpPr>
+        <p:spPr>
+          <a:xfrm>
+            <a:off x="7621114" y="3189076"/>
+            <a:ext cx="361220" cy="655"/>
+          </a:xfrm>
+          <a:prstGeom prst="straightConnector1">
+            <a:avLst/>
+          </a:prstGeom>
+          <a:ln w="25400" cmpd="sng">
+            <a:tailEnd type="triangle"/>
+          </a:ln>
+        </p:spPr>
+        <p:style>
+          <a:lnRef idx="2">
+            <a:schemeClr val="dk1"/>
+          </a:lnRef>
+          <a:fillRef idx="0">
+            <a:schemeClr val="dk1"/>
+          </a:fillRef>
+          <a:effectRef idx="1">
+            <a:schemeClr val="dk1"/>
+          </a:effectRef>
+          <a:fontRef idx="minor">
+            <a:schemeClr val="tx1"/>
+          </a:fontRef>
+        </p:style>
+      </p:cxnSp>
+      <p:sp>
+        <p:nvSpPr>
+          <p:cNvPr id="159" name="Rettangolo 158">
+            <a:extLst>
+              <a:ext uri="{FF2B5EF4-FFF2-40B4-BE49-F238E27FC236}">
+                <a16:creationId xmlns:a16="http://schemas.microsoft.com/office/drawing/2014/main" id="{C6CF0391-C981-8FEE-27A5-034889F8D724}"/>
+              </a:ext>
+            </a:extLst>
+          </p:cNvPr>
+          <p:cNvSpPr/>
+          <p:nvPr/>
+        </p:nvSpPr>
+        <p:spPr>
+          <a:xfrm rot="5400000">
+            <a:off x="7222482" y="3043571"/>
+            <a:ext cx="1812022" cy="292319"/>
+          </a:xfrm>
+          <a:prstGeom prst="rect">
+            <a:avLst/>
+          </a:prstGeom>
+          <a:solidFill>
+            <a:srgbClr val="92D050"/>
+          </a:solidFill>
+        </p:spPr>
+        <p:style>
+          <a:lnRef idx="2">
+            <a:schemeClr val="accent1">
+              <a:shade val="15000"/>
+            </a:schemeClr>
+          </a:lnRef>
+          <a:fillRef idx="1">
+            <a:schemeClr val="accent1"/>
+          </a:fillRef>
+          <a:effectRef idx="0">
+            <a:schemeClr val="accent1"/>
+          </a:effectRef>
+          <a:fontRef idx="minor">
+            <a:schemeClr val="lt1"/>
+          </a:fontRef>
+        </p:style>
+        <p:txBody>
+          <a:bodyPr rtlCol="0" anchor="ctr"/>
+          <a:lstStyle/>
+          <a:p>
+            <a:pPr algn="ctr"/>
+            <a:r>
+              <a:rPr lang="it-IT" dirty="0">
+                <a:solidFill>
+                  <a:schemeClr val="tx1"/>
+                </a:solidFill>
+              </a:rPr>
+              <a:t>ATTENTION</a:t>
+            </a:r>
+          </a:p>
+        </p:txBody>
+      </p:sp>
+      <p:cxnSp>
+        <p:nvCxnSpPr>
+          <p:cNvPr id="160" name="Connettore 2 159">
+            <a:extLst>
+              <a:ext uri="{FF2B5EF4-FFF2-40B4-BE49-F238E27FC236}">
+                <a16:creationId xmlns:a16="http://schemas.microsoft.com/office/drawing/2014/main" id="{85BCFB66-78CE-6278-6E55-5E4EBF92F77A}"/>
+              </a:ext>
+            </a:extLst>
+          </p:cNvPr>
+          <p:cNvCxnSpPr>
+            <a:cxnSpLocks/>
+            <a:endCxn id="215" idx="1"/>
+          </p:cNvCxnSpPr>
+          <p:nvPr/>
+        </p:nvCxnSpPr>
+        <p:spPr>
+          <a:xfrm flipV="1">
+            <a:off x="6128270" y="3258285"/>
+            <a:ext cx="600882" cy="53073"/>
+          </a:xfrm>
+          <a:prstGeom prst="straightConnector1">
+            <a:avLst/>
+          </a:prstGeom>
+          <a:ln w="25400" cmpd="sng">
+            <a:tailEnd type="triangle"/>
+          </a:ln>
+        </p:spPr>
+        <p:style>
+          <a:lnRef idx="2">
+            <a:schemeClr val="dk1"/>
+          </a:lnRef>
+          <a:fillRef idx="0">
+            <a:schemeClr val="dk1"/>
+          </a:fillRef>
+          <a:effectRef idx="1">
+            <a:schemeClr val="dk1"/>
+          </a:effectRef>
+          <a:fontRef idx="minor">
+            <a:schemeClr val="tx1"/>
+          </a:fontRef>
+        </p:style>
+      </p:cxnSp>
+      <p:sp>
+        <p:nvSpPr>
+          <p:cNvPr id="169" name="Rettangolo 168">
+            <a:extLst>
+              <a:ext uri="{FF2B5EF4-FFF2-40B4-BE49-F238E27FC236}">
+                <a16:creationId xmlns:a16="http://schemas.microsoft.com/office/drawing/2014/main" id="{B6F4C740-ABB7-7AF7-9F00-78E2668F7A1D}"/>
+              </a:ext>
+            </a:extLst>
+          </p:cNvPr>
+          <p:cNvSpPr/>
+          <p:nvPr/>
+        </p:nvSpPr>
+        <p:spPr>
+          <a:xfrm>
+            <a:off x="7014005" y="4521425"/>
+            <a:ext cx="400497" cy="608826"/>
+          </a:xfrm>
+          <a:prstGeom prst="rect">
+            <a:avLst/>
+          </a:prstGeom>
+          <a:solidFill>
+            <a:schemeClr val="accent2">
+              <a:lumMod val="60000"/>
+              <a:lumOff val="40000"/>
+            </a:schemeClr>
+          </a:solidFill>
+        </p:spPr>
+        <p:style>
+          <a:lnRef idx="2">
+            <a:schemeClr val="accent1">
+              <a:shade val="15000"/>
+            </a:schemeClr>
+          </a:lnRef>
+          <a:fillRef idx="1">
+            <a:schemeClr val="accent1"/>
+          </a:fillRef>
+          <a:effectRef idx="0">
+            <a:schemeClr val="accent1"/>
+          </a:effectRef>
+          <a:fontRef idx="minor">
+            <a:schemeClr val="lt1"/>
+          </a:fontRef>
+        </p:style>
+        <p:txBody>
+          <a:bodyPr rtlCol="0" anchor="ctr"/>
+          <a:lstStyle/>
+          <a:p>
+            <a:pPr algn="ctr"/>
+            <a:endParaRPr lang="it-IT"/>
+          </a:p>
+        </p:txBody>
+      </p:sp>
+      <p:sp>
+        <p:nvSpPr>
+          <p:cNvPr id="170" name="Rettangolo 169">
+            <a:extLst>
+              <a:ext uri="{FF2B5EF4-FFF2-40B4-BE49-F238E27FC236}">
+                <a16:creationId xmlns:a16="http://schemas.microsoft.com/office/drawing/2014/main" id="{6B14954D-3814-8005-6F4C-430E224877DA}"/>
+              </a:ext>
+            </a:extLst>
+          </p:cNvPr>
+          <p:cNvSpPr/>
+          <p:nvPr/>
+        </p:nvSpPr>
+        <p:spPr>
+          <a:xfrm rot="5400000">
+            <a:off x="6957495" y="4577932"/>
+            <a:ext cx="271806" cy="158793"/>
+          </a:xfrm>
+          <a:prstGeom prst="rect">
+            <a:avLst/>
+          </a:prstGeom>
+          <a:solidFill>
+            <a:schemeClr val="accent2"/>
+          </a:solidFill>
+        </p:spPr>
+        <p:style>
+          <a:lnRef idx="2">
+            <a:schemeClr val="accent1">
+              <a:shade val="15000"/>
+            </a:schemeClr>
+          </a:lnRef>
+          <a:fillRef idx="1">
+            <a:schemeClr val="accent1"/>
+          </a:fillRef>
+          <a:effectRef idx="0">
+            <a:schemeClr val="accent1"/>
+          </a:effectRef>
+          <a:fontRef idx="minor">
+            <a:schemeClr val="lt1"/>
+          </a:fontRef>
+        </p:style>
+        <p:txBody>
+          <a:bodyPr rtlCol="0" anchor="ctr"/>
+          <a:lstStyle/>
+          <a:p>
+            <a:pPr algn="ctr"/>
+            <a:endParaRPr lang="it-IT" sz="1100" b="1" dirty="0">
+              <a:solidFill>
+                <a:schemeClr val="tx1"/>
+              </a:solidFill>
+            </a:endParaRPr>
+          </a:p>
+        </p:txBody>
+      </p:sp>
+      <p:sp>
+        <p:nvSpPr>
+          <p:cNvPr id="171" name="Rettangolo 170">
+            <a:extLst>
+              <a:ext uri="{FF2B5EF4-FFF2-40B4-BE49-F238E27FC236}">
+                <a16:creationId xmlns:a16="http://schemas.microsoft.com/office/drawing/2014/main" id="{A4B13B83-E231-7074-82EC-0A060CD53CEA}"/>
+              </a:ext>
+            </a:extLst>
+          </p:cNvPr>
+          <p:cNvSpPr/>
+          <p:nvPr/>
+        </p:nvSpPr>
+        <p:spPr>
+          <a:xfrm rot="5400000">
+            <a:off x="7083681" y="4751808"/>
+            <a:ext cx="271806" cy="204079"/>
+          </a:xfrm>
+          <a:prstGeom prst="rect">
+            <a:avLst/>
+          </a:prstGeom>
+          <a:solidFill>
+            <a:srgbClr val="0096FF"/>
+          </a:solidFill>
+        </p:spPr>
+        <p:style>
+          <a:lnRef idx="2">
+            <a:schemeClr val="accent1">
+              <a:shade val="15000"/>
+            </a:schemeClr>
+          </a:lnRef>
+          <a:fillRef idx="1">
+            <a:schemeClr val="accent1"/>
+          </a:fillRef>
+          <a:effectRef idx="0">
+            <a:schemeClr val="accent1"/>
+          </a:effectRef>
+          <a:fontRef idx="minor">
+            <a:schemeClr val="lt1"/>
+          </a:fontRef>
+        </p:style>
+        <p:txBody>
+          <a:bodyPr rtlCol="0" anchor="ctr"/>
+          <a:lstStyle/>
+          <a:p>
+            <a:pPr algn="ctr"/>
+            <a:endParaRPr lang="it-IT" sz="1300" b="1" dirty="0">
+              <a:solidFill>
+                <a:schemeClr val="tx1"/>
+              </a:solidFill>
+            </a:endParaRPr>
+          </a:p>
+        </p:txBody>
+      </p:sp>
+      <p:sp>
+        <p:nvSpPr>
+          <p:cNvPr id="172" name="Rettangolo 171">
+            <a:extLst>
+              <a:ext uri="{FF2B5EF4-FFF2-40B4-BE49-F238E27FC236}">
+                <a16:creationId xmlns:a16="http://schemas.microsoft.com/office/drawing/2014/main" id="{EB822A3D-8480-8628-B6BE-808126B6AD8D}"/>
+              </a:ext>
+            </a:extLst>
+          </p:cNvPr>
+          <p:cNvSpPr/>
+          <p:nvPr/>
+        </p:nvSpPr>
+        <p:spPr>
+          <a:xfrm rot="5400000">
+            <a:off x="7244504" y="4960253"/>
+            <a:ext cx="181202" cy="158793"/>
+          </a:xfrm>
+          <a:prstGeom prst="rect">
+            <a:avLst/>
+          </a:prstGeom>
+          <a:solidFill>
+            <a:srgbClr val="FFFD78"/>
+          </a:solidFill>
+        </p:spPr>
+        <p:style>
+          <a:lnRef idx="2">
+            <a:schemeClr val="accent1">
+              <a:shade val="15000"/>
+            </a:schemeClr>
+          </a:lnRef>
+          <a:fillRef idx="1">
+            <a:schemeClr val="accent1"/>
+          </a:fillRef>
+          <a:effectRef idx="0">
+            <a:schemeClr val="accent1"/>
+          </a:effectRef>
+          <a:fontRef idx="minor">
+            <a:schemeClr val="lt1"/>
+          </a:fontRef>
+        </p:style>
+        <p:txBody>
+          <a:bodyPr rtlCol="0" anchor="ctr"/>
+          <a:lstStyle/>
+          <a:p>
+            <a:pPr algn="ctr"/>
+            <a:endParaRPr lang="it-IT" sz="1100" b="1" dirty="0">
+              <a:solidFill>
+                <a:schemeClr val="tx1"/>
+              </a:solidFill>
+            </a:endParaRPr>
+          </a:p>
+        </p:txBody>
+      </p:sp>
+      <p:cxnSp>
+        <p:nvCxnSpPr>
+          <p:cNvPr id="184" name="Connettore 4 183">
+            <a:extLst>
+              <a:ext uri="{FF2B5EF4-FFF2-40B4-BE49-F238E27FC236}">
+                <a16:creationId xmlns:a16="http://schemas.microsoft.com/office/drawing/2014/main" id="{54FB111E-B733-6117-503A-460AD1FCFF66}"/>
+              </a:ext>
+            </a:extLst>
+          </p:cNvPr>
+          <p:cNvCxnSpPr>
+            <a:cxnSpLocks/>
+            <a:stCxn id="140" idx="3"/>
+            <a:endCxn id="169" idx="1"/>
+          </p:cNvCxnSpPr>
+          <p:nvPr/>
+        </p:nvCxnSpPr>
+        <p:spPr>
+          <a:xfrm rot="16200000" flipH="1">
+            <a:off x="6198679" y="4010511"/>
+            <a:ext cx="624753" cy="1005900"/>
+          </a:xfrm>
+          <a:prstGeom prst="bentConnector2">
+            <a:avLst/>
+          </a:prstGeom>
+          <a:ln>
+            <a:tailEnd type="triangle"/>
+          </a:ln>
+        </p:spPr>
+        <p:style>
+          <a:lnRef idx="3">
+            <a:schemeClr val="dk1"/>
+          </a:lnRef>
+          <a:fillRef idx="0">
+            <a:schemeClr val="dk1"/>
+          </a:fillRef>
+          <a:effectRef idx="2">
+            <a:schemeClr val="dk1"/>
+          </a:effectRef>
+          <a:fontRef idx="minor">
+            <a:schemeClr val="tx1"/>
+          </a:fontRef>
+        </p:style>
+      </p:cxnSp>
+      <p:cxnSp>
+        <p:nvCxnSpPr>
+          <p:cNvPr id="186" name="Connettore 4 185">
+            <a:extLst>
+              <a:ext uri="{FF2B5EF4-FFF2-40B4-BE49-F238E27FC236}">
+                <a16:creationId xmlns:a16="http://schemas.microsoft.com/office/drawing/2014/main" id="{355636B1-B414-0F58-EC87-99A771303FD8}"/>
+              </a:ext>
+            </a:extLst>
+          </p:cNvPr>
+          <p:cNvCxnSpPr>
+            <a:cxnSpLocks/>
+            <a:stCxn id="169" idx="3"/>
+            <a:endCxn id="159" idx="3"/>
+          </p:cNvCxnSpPr>
+          <p:nvPr/>
+        </p:nvCxnSpPr>
+        <p:spPr>
+          <a:xfrm flipV="1">
+            <a:off x="7414502" y="4095742"/>
+            <a:ext cx="713991" cy="730096"/>
+          </a:xfrm>
+          <a:prstGeom prst="bentConnector2">
+            <a:avLst/>
+          </a:prstGeom>
+          <a:ln>
+            <a:tailEnd type="triangle"/>
+          </a:ln>
+        </p:spPr>
+        <p:style>
+          <a:lnRef idx="3">
+            <a:schemeClr val="dk1"/>
+          </a:lnRef>
+          <a:fillRef idx="0">
+            <a:schemeClr val="dk1"/>
+          </a:fillRef>
+          <a:effectRef idx="2">
+            <a:schemeClr val="dk1"/>
+          </a:effectRef>
+          <a:fontRef idx="minor">
+            <a:schemeClr val="tx1"/>
+          </a:fontRef>
+        </p:style>
+      </p:cxnSp>
+      <p:sp>
+        <p:nvSpPr>
+          <p:cNvPr id="189" name="Rettangolo 188">
+            <a:extLst>
+              <a:ext uri="{FF2B5EF4-FFF2-40B4-BE49-F238E27FC236}">
+                <a16:creationId xmlns:a16="http://schemas.microsoft.com/office/drawing/2014/main" id="{13B9A7D6-879B-627C-9F17-D6BFB9AF7FE9}"/>
+              </a:ext>
+            </a:extLst>
+          </p:cNvPr>
+          <p:cNvSpPr/>
+          <p:nvPr/>
+        </p:nvSpPr>
+        <p:spPr>
+          <a:xfrm rot="5400000">
+            <a:off x="7970697" y="3120868"/>
+            <a:ext cx="1375794" cy="234459"/>
+          </a:xfrm>
+          <a:prstGeom prst="rect">
+            <a:avLst/>
+          </a:prstGeom>
+          <a:solidFill>
+            <a:schemeClr val="bg1">
+              <a:lumMod val="85000"/>
+            </a:schemeClr>
+          </a:solidFill>
+        </p:spPr>
+        <p:style>
+          <a:lnRef idx="2">
+            <a:schemeClr val="accent1">
+              <a:shade val="15000"/>
+            </a:schemeClr>
+          </a:lnRef>
+          <a:fillRef idx="1">
+            <a:schemeClr val="accent1"/>
+          </a:fillRef>
+          <a:effectRef idx="0">
+            <a:schemeClr val="accent1"/>
+          </a:effectRef>
+          <a:fontRef idx="minor">
+            <a:schemeClr val="lt1"/>
+          </a:fontRef>
+        </p:style>
+        <p:txBody>
+          <a:bodyPr rtlCol="0" anchor="ctr"/>
+          <a:lstStyle/>
+          <a:p>
+            <a:pPr algn="ctr"/>
+            <a:r>
+              <a:rPr lang="it-IT" sz="1300" dirty="0">
+                <a:solidFill>
+                  <a:schemeClr val="tx1"/>
+                </a:solidFill>
+              </a:rPr>
+              <a:t>CONCATENATE</a:t>
+            </a:r>
+          </a:p>
+        </p:txBody>
+      </p:sp>
+      <p:cxnSp>
+        <p:nvCxnSpPr>
+          <p:cNvPr id="190" name="Connettore 2 189">
+            <a:extLst>
+              <a:ext uri="{FF2B5EF4-FFF2-40B4-BE49-F238E27FC236}">
+                <a16:creationId xmlns:a16="http://schemas.microsoft.com/office/drawing/2014/main" id="{02CFB37E-B21F-F448-D686-1774F4B28D34}"/>
+              </a:ext>
+            </a:extLst>
+          </p:cNvPr>
+          <p:cNvCxnSpPr>
+            <a:cxnSpLocks/>
+            <a:endCxn id="189" idx="2"/>
+          </p:cNvCxnSpPr>
+          <p:nvPr/>
+        </p:nvCxnSpPr>
+        <p:spPr>
+          <a:xfrm>
+            <a:off x="8274653" y="3208215"/>
+            <a:ext cx="266712" cy="29883"/>
+          </a:xfrm>
+          <a:prstGeom prst="straightConnector1">
+            <a:avLst/>
+          </a:prstGeom>
+          <a:ln w="25400" cmpd="sng">
+            <a:tailEnd type="triangle"/>
+          </a:ln>
+        </p:spPr>
+        <p:style>
+          <a:lnRef idx="2">
+            <a:schemeClr val="dk1"/>
+          </a:lnRef>
+          <a:fillRef idx="0">
+            <a:schemeClr val="dk1"/>
+          </a:fillRef>
+          <a:effectRef idx="1">
+            <a:schemeClr val="dk1"/>
+          </a:effectRef>
+          <a:fontRef idx="minor">
+            <a:schemeClr val="tx1"/>
+          </a:fontRef>
+        </p:style>
+      </p:cxnSp>
+      <p:cxnSp>
+        <p:nvCxnSpPr>
+          <p:cNvPr id="193" name="Connettore 4 192">
+            <a:extLst>
+              <a:ext uri="{FF2B5EF4-FFF2-40B4-BE49-F238E27FC236}">
+                <a16:creationId xmlns:a16="http://schemas.microsoft.com/office/drawing/2014/main" id="{0F9C0A4A-5C28-E3B9-66C0-EE3755925149}"/>
+              </a:ext>
+            </a:extLst>
+          </p:cNvPr>
+          <p:cNvCxnSpPr>
+            <a:cxnSpLocks/>
+            <a:stCxn id="147" idx="0"/>
+            <a:endCxn id="189" idx="1"/>
+          </p:cNvCxnSpPr>
+          <p:nvPr/>
+        </p:nvCxnSpPr>
+        <p:spPr>
+          <a:xfrm rot="16200000" flipH="1">
+            <a:off x="7803642" y="1695250"/>
+            <a:ext cx="276136" cy="1433767"/>
+          </a:xfrm>
+          <a:prstGeom prst="bentConnector3">
+            <a:avLst>
+              <a:gd name="adj1" fmla="val -134432"/>
+            </a:avLst>
+          </a:prstGeom>
+          <a:ln>
+            <a:headEnd type="triangle"/>
+            <a:tailEnd type="triangle"/>
+          </a:ln>
+        </p:spPr>
+        <p:style>
+          <a:lnRef idx="2">
+            <a:schemeClr val="dk1"/>
+          </a:lnRef>
+          <a:fillRef idx="0">
+            <a:schemeClr val="dk1"/>
+          </a:fillRef>
+          <a:effectRef idx="1">
+            <a:schemeClr val="dk1"/>
+          </a:effectRef>
+          <a:fontRef idx="minor">
+            <a:schemeClr val="tx1"/>
+          </a:fontRef>
+        </p:style>
+      </p:cxnSp>
+      <p:cxnSp>
+        <p:nvCxnSpPr>
+          <p:cNvPr id="195" name="Connettore 2 194">
+            <a:extLst>
+              <a:ext uri="{FF2B5EF4-FFF2-40B4-BE49-F238E27FC236}">
+                <a16:creationId xmlns:a16="http://schemas.microsoft.com/office/drawing/2014/main" id="{0E0D51DF-54C9-E76E-A4C6-7FA9E94A2A06}"/>
+              </a:ext>
+            </a:extLst>
+          </p:cNvPr>
+          <p:cNvCxnSpPr>
+            <a:cxnSpLocks/>
+            <a:endCxn id="202" idx="0"/>
+          </p:cNvCxnSpPr>
+          <p:nvPr/>
+        </p:nvCxnSpPr>
+        <p:spPr>
+          <a:xfrm>
+            <a:off x="9096928" y="1351883"/>
+            <a:ext cx="11071" cy="1804288"/>
+          </a:xfrm>
+          <a:prstGeom prst="straightConnector1">
+            <a:avLst/>
+          </a:prstGeom>
+          <a:ln w="25400" cmpd="sng">
+            <a:tailEnd type="triangle"/>
+          </a:ln>
+        </p:spPr>
+        <p:style>
+          <a:lnRef idx="2">
+            <a:schemeClr val="dk1"/>
+          </a:lnRef>
+          <a:fillRef idx="0">
+            <a:schemeClr val="dk1"/>
+          </a:fillRef>
+          <a:effectRef idx="1">
+            <a:schemeClr val="dk1"/>
+          </a:effectRef>
+          <a:fontRef idx="minor">
+            <a:schemeClr val="tx1"/>
+          </a:fontRef>
+        </p:style>
+      </p:cxnSp>
+      <p:cxnSp>
+        <p:nvCxnSpPr>
+          <p:cNvPr id="198" name="Connettore 2 197">
+            <a:extLst>
+              <a:ext uri="{FF2B5EF4-FFF2-40B4-BE49-F238E27FC236}">
+                <a16:creationId xmlns:a16="http://schemas.microsoft.com/office/drawing/2014/main" id="{A57A5493-C530-0B4C-6107-B7FB52C9F9B8}"/>
+              </a:ext>
+            </a:extLst>
+          </p:cNvPr>
+          <p:cNvCxnSpPr>
+            <a:cxnSpLocks/>
+          </p:cNvCxnSpPr>
+          <p:nvPr/>
+        </p:nvCxnSpPr>
+        <p:spPr>
+          <a:xfrm>
+            <a:off x="8775824" y="3250600"/>
+            <a:ext cx="228226" cy="7685"/>
+          </a:xfrm>
+          <a:prstGeom prst="straightConnector1">
+            <a:avLst/>
+          </a:prstGeom>
+          <a:ln w="25400" cmpd="sng">
+            <a:tailEnd type="triangle"/>
+          </a:ln>
+        </p:spPr>
+        <p:style>
+          <a:lnRef idx="2">
+            <a:schemeClr val="dk1"/>
+          </a:lnRef>
+          <a:fillRef idx="0">
+            <a:schemeClr val="dk1"/>
+          </a:fillRef>
+          <a:effectRef idx="1">
+            <a:schemeClr val="dk1"/>
+          </a:effectRef>
+          <a:fontRef idx="minor">
+            <a:schemeClr val="tx1"/>
+          </a:fontRef>
+        </p:style>
+      </p:cxnSp>
+      <p:sp>
+        <p:nvSpPr>
+          <p:cNvPr id="202" name="OR 201">
+            <a:extLst>
+              <a:ext uri="{FF2B5EF4-FFF2-40B4-BE49-F238E27FC236}">
+                <a16:creationId xmlns:a16="http://schemas.microsoft.com/office/drawing/2014/main" id="{8FEE8912-6159-E9B4-9BA5-0975B3FF2D15}"/>
+              </a:ext>
+            </a:extLst>
+          </p:cNvPr>
+          <p:cNvSpPr/>
+          <p:nvPr/>
+        </p:nvSpPr>
+        <p:spPr>
+          <a:xfrm>
+            <a:off x="9017531" y="3156171"/>
+            <a:ext cx="180936" cy="188858"/>
+          </a:xfrm>
+          <a:prstGeom prst="flowChartOr">
+            <a:avLst/>
+          </a:prstGeom>
+          <a:ln/>
+        </p:spPr>
+        <p:style>
+          <a:lnRef idx="2">
+            <a:schemeClr val="dk1"/>
+          </a:lnRef>
+          <a:fillRef idx="1">
+            <a:schemeClr val="lt1"/>
+          </a:fillRef>
+          <a:effectRef idx="0">
+            <a:schemeClr val="dk1"/>
+          </a:effectRef>
+          <a:fontRef idx="minor">
+            <a:schemeClr val="dk1"/>
+          </a:fontRef>
+        </p:style>
+        <p:txBody>
+          <a:bodyPr rtlCol="0" anchor="ctr"/>
+          <a:lstStyle/>
+          <a:p>
+            <a:pPr algn="ctr"/>
+            <a:endParaRPr lang="it-IT"/>
+          </a:p>
+        </p:txBody>
+      </p:sp>
+      <p:sp>
+        <p:nvSpPr>
+          <p:cNvPr id="206" name="Rettangolo 205">
+            <a:extLst>
+              <a:ext uri="{FF2B5EF4-FFF2-40B4-BE49-F238E27FC236}">
+                <a16:creationId xmlns:a16="http://schemas.microsoft.com/office/drawing/2014/main" id="{C3086294-04FE-3734-980C-C8DAAB6627DB}"/>
+              </a:ext>
+            </a:extLst>
+          </p:cNvPr>
+          <p:cNvSpPr/>
+          <p:nvPr/>
+        </p:nvSpPr>
+        <p:spPr>
+          <a:xfrm>
+            <a:off x="9425896" y="2290536"/>
+            <a:ext cx="792575" cy="1830022"/>
+          </a:xfrm>
+          <a:prstGeom prst="rect">
+            <a:avLst/>
+          </a:prstGeom>
+          <a:solidFill>
+            <a:schemeClr val="accent2">
+              <a:lumMod val="60000"/>
+              <a:lumOff val="40000"/>
+            </a:schemeClr>
+          </a:solidFill>
+        </p:spPr>
+        <p:style>
+          <a:lnRef idx="2">
+            <a:schemeClr val="accent1">
+              <a:shade val="15000"/>
+            </a:schemeClr>
+          </a:lnRef>
+          <a:fillRef idx="1">
+            <a:schemeClr val="accent1"/>
+          </a:fillRef>
+          <a:effectRef idx="0">
+            <a:schemeClr val="accent1"/>
+          </a:effectRef>
+          <a:fontRef idx="minor">
+            <a:schemeClr val="lt1"/>
+          </a:fontRef>
+        </p:style>
+        <p:txBody>
+          <a:bodyPr rtlCol="0" anchor="ctr"/>
+          <a:lstStyle/>
+          <a:p>
+            <a:pPr algn="ctr"/>
+            <a:endParaRPr lang="it-IT"/>
+          </a:p>
+        </p:txBody>
+      </p:sp>
+      <p:sp>
+        <p:nvSpPr>
+          <p:cNvPr id="207" name="Rettangolo 206">
+            <a:extLst>
+              <a:ext uri="{FF2B5EF4-FFF2-40B4-BE49-F238E27FC236}">
+                <a16:creationId xmlns:a16="http://schemas.microsoft.com/office/drawing/2014/main" id="{3B0A7321-73C3-B9E6-5207-B7F609C92980}"/>
+              </a:ext>
+            </a:extLst>
+          </p:cNvPr>
+          <p:cNvSpPr/>
+          <p:nvPr/>
+        </p:nvSpPr>
+        <p:spPr>
+          <a:xfrm rot="5400000">
+            <a:off x="9212437" y="2503993"/>
+            <a:ext cx="733013" cy="306098"/>
+          </a:xfrm>
+          <a:prstGeom prst="rect">
+            <a:avLst/>
+          </a:prstGeom>
+          <a:solidFill>
+            <a:schemeClr val="accent2"/>
+          </a:solidFill>
+        </p:spPr>
+        <p:style>
+          <a:lnRef idx="2">
+            <a:schemeClr val="accent1">
+              <a:shade val="15000"/>
+            </a:schemeClr>
+          </a:lnRef>
+          <a:fillRef idx="1">
+            <a:schemeClr val="accent1"/>
+          </a:fillRef>
+          <a:effectRef idx="0">
+            <a:schemeClr val="accent1"/>
+          </a:effectRef>
+          <a:fontRef idx="minor">
+            <a:schemeClr val="lt1"/>
+          </a:fontRef>
+        </p:style>
+        <p:txBody>
+          <a:bodyPr rtlCol="0" anchor="ctr"/>
+          <a:lstStyle/>
+          <a:p>
+            <a:pPr algn="ctr"/>
+            <a:r>
+              <a:rPr lang="it-IT" sz="1100" b="1" dirty="0">
+                <a:solidFill>
+                  <a:schemeClr val="tx1"/>
+                </a:solidFill>
+              </a:rPr>
+              <a:t>Conv2D</a:t>
+            </a:r>
+          </a:p>
+        </p:txBody>
+      </p:sp>
+      <p:sp>
+        <p:nvSpPr>
+          <p:cNvPr id="208" name="Rettangolo 207">
+            <a:extLst>
+              <a:ext uri="{FF2B5EF4-FFF2-40B4-BE49-F238E27FC236}">
+                <a16:creationId xmlns:a16="http://schemas.microsoft.com/office/drawing/2014/main" id="{F044690E-0007-658C-B5E7-06BF2B92CA3D}"/>
+              </a:ext>
+            </a:extLst>
+          </p:cNvPr>
+          <p:cNvSpPr/>
+          <p:nvPr/>
+        </p:nvSpPr>
+        <p:spPr>
+          <a:xfrm rot="5400000">
+            <a:off x="9475146" y="3116844"/>
+            <a:ext cx="733015" cy="393394"/>
+          </a:xfrm>
+          <a:prstGeom prst="rect">
+            <a:avLst/>
+          </a:prstGeom>
+          <a:solidFill>
+            <a:srgbClr val="0096FF"/>
+          </a:solidFill>
+        </p:spPr>
+        <p:style>
+          <a:lnRef idx="2">
+            <a:schemeClr val="accent1">
+              <a:shade val="15000"/>
+            </a:schemeClr>
+          </a:lnRef>
+          <a:fillRef idx="1">
+            <a:schemeClr val="accent1"/>
+          </a:fillRef>
+          <a:effectRef idx="0">
+            <a:schemeClr val="accent1"/>
+          </a:effectRef>
+          <a:fontRef idx="minor">
+            <a:schemeClr val="lt1"/>
+          </a:fontRef>
+        </p:style>
+        <p:txBody>
+          <a:bodyPr rtlCol="0" anchor="ctr"/>
+          <a:lstStyle/>
+          <a:p>
+            <a:pPr algn="ctr"/>
+            <a:r>
+              <a:rPr lang="it-IT" sz="1300" b="1" dirty="0">
+                <a:solidFill>
+                  <a:schemeClr val="tx1"/>
+                </a:solidFill>
+              </a:rPr>
+              <a:t>Batch </a:t>
+            </a:r>
+            <a:r>
+              <a:rPr lang="it-IT" sz="1300" b="1" dirty="0" err="1">
+                <a:solidFill>
+                  <a:schemeClr val="tx1"/>
+                </a:solidFill>
+              </a:rPr>
+              <a:t>Nrom</a:t>
+            </a:r>
+            <a:endParaRPr lang="it-IT" sz="1300" b="1" dirty="0">
+              <a:solidFill>
+                <a:schemeClr val="tx1"/>
+              </a:solidFill>
+            </a:endParaRPr>
+          </a:p>
+        </p:txBody>
+      </p:sp>
+      <p:sp>
+        <p:nvSpPr>
+          <p:cNvPr id="209" name="Rettangolo 208">
+            <a:extLst>
+              <a:ext uri="{FF2B5EF4-FFF2-40B4-BE49-F238E27FC236}">
+                <a16:creationId xmlns:a16="http://schemas.microsoft.com/office/drawing/2014/main" id="{9F0961B2-A93D-BDBD-D5F6-3334F8E16B52}"/>
+              </a:ext>
+            </a:extLst>
+          </p:cNvPr>
+          <p:cNvSpPr/>
+          <p:nvPr/>
+        </p:nvSpPr>
+        <p:spPr>
+          <a:xfrm rot="5400000">
+            <a:off x="9821086" y="3714827"/>
+            <a:ext cx="488672" cy="306098"/>
+          </a:xfrm>
+          <a:prstGeom prst="rect">
+            <a:avLst/>
+          </a:prstGeom>
+          <a:solidFill>
+            <a:srgbClr val="FFFD78"/>
+          </a:solidFill>
+        </p:spPr>
+        <p:style>
+          <a:lnRef idx="2">
+            <a:schemeClr val="accent1">
+              <a:shade val="15000"/>
+            </a:schemeClr>
+          </a:lnRef>
+          <a:fillRef idx="1">
+            <a:schemeClr val="accent1"/>
+          </a:fillRef>
+          <a:effectRef idx="0">
+            <a:schemeClr val="accent1"/>
+          </a:effectRef>
+          <a:fontRef idx="minor">
+            <a:schemeClr val="lt1"/>
+          </a:fontRef>
+        </p:style>
+        <p:txBody>
+          <a:bodyPr rtlCol="0" anchor="ctr"/>
+          <a:lstStyle/>
+          <a:p>
+            <a:pPr algn="ctr"/>
+            <a:r>
+              <a:rPr lang="it-IT" sz="1100" b="1" dirty="0" err="1">
+                <a:solidFill>
+                  <a:schemeClr val="tx1"/>
+                </a:solidFill>
+              </a:rPr>
+              <a:t>Relu</a:t>
+            </a:r>
+            <a:endParaRPr lang="it-IT" sz="1100" b="1" dirty="0">
+              <a:solidFill>
+                <a:schemeClr val="tx1"/>
+              </a:solidFill>
+            </a:endParaRPr>
+          </a:p>
+        </p:txBody>
+      </p:sp>
+      <p:cxnSp>
+        <p:nvCxnSpPr>
+          <p:cNvPr id="210" name="Connettore 2 209">
+            <a:extLst>
+              <a:ext uri="{FF2B5EF4-FFF2-40B4-BE49-F238E27FC236}">
+                <a16:creationId xmlns:a16="http://schemas.microsoft.com/office/drawing/2014/main" id="{E588F1C3-15A7-FC62-E04D-882D45FB7696}"/>
+              </a:ext>
+            </a:extLst>
+          </p:cNvPr>
+          <p:cNvCxnSpPr>
+            <a:cxnSpLocks/>
+            <a:stCxn id="206" idx="3"/>
+          </p:cNvCxnSpPr>
+          <p:nvPr/>
+        </p:nvCxnSpPr>
+        <p:spPr>
+          <a:xfrm>
+            <a:off x="10218471" y="3205547"/>
+            <a:ext cx="219060" cy="0"/>
+          </a:xfrm>
+          <a:prstGeom prst="straightConnector1">
+            <a:avLst/>
+          </a:prstGeom>
+          <a:ln w="25400" cmpd="sng">
+            <a:tailEnd type="triangle"/>
+          </a:ln>
+        </p:spPr>
+        <p:style>
+          <a:lnRef idx="2">
+            <a:schemeClr val="dk1"/>
+          </a:lnRef>
+          <a:fillRef idx="0">
+            <a:schemeClr val="dk1"/>
+          </a:fillRef>
+          <a:effectRef idx="1">
+            <a:schemeClr val="dk1"/>
+          </a:effectRef>
+          <a:fontRef idx="minor">
+            <a:schemeClr val="tx1"/>
+          </a:fontRef>
+        </p:style>
+      </p:cxnSp>
+      <p:cxnSp>
+        <p:nvCxnSpPr>
+          <p:cNvPr id="212" name="Connettore 2 211">
+            <a:extLst>
+              <a:ext uri="{FF2B5EF4-FFF2-40B4-BE49-F238E27FC236}">
+                <a16:creationId xmlns:a16="http://schemas.microsoft.com/office/drawing/2014/main" id="{D3686189-3F9D-983D-F97B-BD27795DA2CE}"/>
+              </a:ext>
+            </a:extLst>
+          </p:cNvPr>
+          <p:cNvCxnSpPr>
+            <a:cxnSpLocks/>
+          </p:cNvCxnSpPr>
+          <p:nvPr/>
+        </p:nvCxnSpPr>
+        <p:spPr>
+          <a:xfrm>
+            <a:off x="9197670" y="3242915"/>
+            <a:ext cx="228226" cy="7685"/>
+          </a:xfrm>
+          <a:prstGeom prst="straightConnector1">
+            <a:avLst/>
+          </a:prstGeom>
+          <a:ln w="25400" cmpd="sng">
+            <a:tailEnd type="triangle"/>
+          </a:ln>
+        </p:spPr>
+        <p:style>
+          <a:lnRef idx="2">
+            <a:schemeClr val="dk1"/>
+          </a:lnRef>
+          <a:fillRef idx="0">
+            <a:schemeClr val="dk1"/>
+          </a:fillRef>
+          <a:effectRef idx="1">
+            <a:schemeClr val="dk1"/>
+          </a:effectRef>
+          <a:fontRef idx="minor">
+            <a:schemeClr val="tx1"/>
+          </a:fontRef>
+        </p:style>
+      </p:cxnSp>
+      <p:sp>
+        <p:nvSpPr>
+          <p:cNvPr id="213" name="Rettangolo 212">
+            <a:extLst>
+              <a:ext uri="{FF2B5EF4-FFF2-40B4-BE49-F238E27FC236}">
+                <a16:creationId xmlns:a16="http://schemas.microsoft.com/office/drawing/2014/main" id="{A8A358B8-1888-740F-332B-71985B5CD489}"/>
+              </a:ext>
+            </a:extLst>
+          </p:cNvPr>
+          <p:cNvSpPr/>
+          <p:nvPr/>
+        </p:nvSpPr>
+        <p:spPr>
+          <a:xfrm rot="5400000">
+            <a:off x="9691307" y="3085048"/>
+            <a:ext cx="1787520" cy="306098"/>
+          </a:xfrm>
+          <a:prstGeom prst="rect">
+            <a:avLst/>
+          </a:prstGeom>
+          <a:solidFill>
+            <a:schemeClr val="accent2"/>
+          </a:solidFill>
+        </p:spPr>
+        <p:style>
+          <a:lnRef idx="2">
+            <a:schemeClr val="accent1">
+              <a:shade val="15000"/>
+            </a:schemeClr>
+          </a:lnRef>
+          <a:fillRef idx="1">
+            <a:schemeClr val="accent1"/>
+          </a:fillRef>
+          <a:effectRef idx="0">
+            <a:schemeClr val="accent1"/>
+          </a:effectRef>
+          <a:fontRef idx="minor">
+            <a:schemeClr val="lt1"/>
+          </a:fontRef>
+        </p:style>
+        <p:txBody>
+          <a:bodyPr rtlCol="0" anchor="ctr"/>
+          <a:lstStyle/>
+          <a:p>
+            <a:pPr algn="ctr"/>
+            <a:r>
+              <a:rPr lang="it-IT" sz="2000" b="1" dirty="0" err="1">
+                <a:solidFill>
+                  <a:schemeClr val="tx1"/>
+                </a:solidFill>
+              </a:rPr>
+              <a:t>Upsample</a:t>
+            </a:r>
+            <a:endParaRPr lang="it-IT" sz="2000" b="1" dirty="0">
+              <a:solidFill>
+                <a:schemeClr val="tx1"/>
+              </a:solidFill>
+            </a:endParaRPr>
+          </a:p>
+        </p:txBody>
+      </p:sp>
+      <p:sp>
+        <p:nvSpPr>
+          <p:cNvPr id="221" name="CasellaDiTesto 220">
+            <a:extLst>
+              <a:ext uri="{FF2B5EF4-FFF2-40B4-BE49-F238E27FC236}">
+                <a16:creationId xmlns:a16="http://schemas.microsoft.com/office/drawing/2014/main" id="{410A3808-09A1-97E6-F4C3-EC472AE75A97}"/>
+              </a:ext>
+            </a:extLst>
+          </p:cNvPr>
+          <p:cNvSpPr txBox="1"/>
+          <p:nvPr/>
+        </p:nvSpPr>
+        <p:spPr>
+          <a:xfrm>
+            <a:off x="8118238" y="4073498"/>
+            <a:ext cx="1526718" cy="430887"/>
+          </a:xfrm>
+          <a:prstGeom prst="rect">
+            <a:avLst/>
+          </a:prstGeom>
+          <a:noFill/>
+        </p:spPr>
+        <p:txBody>
+          <a:bodyPr wrap="square">
+            <a:spAutoFit/>
+          </a:bodyPr>
+          <a:lstStyle/>
+          <a:p>
+            <a:r>
+              <a:rPr lang="it-IT" sz="2200" dirty="0"/>
+              <a:t>DECODER</a:t>
+            </a:r>
+          </a:p>
+        </p:txBody>
+      </p:sp>
+      <p:sp>
+        <p:nvSpPr>
+          <p:cNvPr id="224" name="Rettangolo 223">
+            <a:extLst>
+              <a:ext uri="{FF2B5EF4-FFF2-40B4-BE49-F238E27FC236}">
+                <a16:creationId xmlns:a16="http://schemas.microsoft.com/office/drawing/2014/main" id="{E1B44ACB-2EE7-E852-35D8-56EE036BCE74}"/>
+              </a:ext>
+            </a:extLst>
+          </p:cNvPr>
+          <p:cNvSpPr/>
+          <p:nvPr/>
+        </p:nvSpPr>
+        <p:spPr>
+          <a:xfrm rot="5400000">
+            <a:off x="10196932" y="3051611"/>
+            <a:ext cx="1887799" cy="233402"/>
+          </a:xfrm>
+          <a:prstGeom prst="rect">
+            <a:avLst/>
+          </a:prstGeom>
+          <a:solidFill>
+            <a:schemeClr val="accent4">
+              <a:lumMod val="40000"/>
+              <a:lumOff val="60000"/>
+            </a:schemeClr>
+          </a:solidFill>
+        </p:spPr>
+        <p:style>
+          <a:lnRef idx="2">
+            <a:schemeClr val="accent1">
+              <a:shade val="15000"/>
+            </a:schemeClr>
+          </a:lnRef>
+          <a:fillRef idx="1">
+            <a:schemeClr val="accent1"/>
+          </a:fillRef>
+          <a:effectRef idx="0">
+            <a:schemeClr val="accent1"/>
+          </a:effectRef>
+          <a:fontRef idx="minor">
+            <a:schemeClr val="lt1"/>
+          </a:fontRef>
+        </p:style>
+        <p:txBody>
+          <a:bodyPr rtlCol="0" anchor="ctr"/>
+          <a:lstStyle/>
+          <a:p>
+            <a:pPr algn="ctr"/>
+            <a:r>
+              <a:rPr lang="it-IT" dirty="0">
+                <a:solidFill>
+                  <a:schemeClr val="tx1"/>
+                </a:solidFill>
+              </a:rPr>
+              <a:t>DECODER</a:t>
+            </a:r>
+          </a:p>
+        </p:txBody>
+      </p:sp>
+      <p:sp>
+        <p:nvSpPr>
+          <p:cNvPr id="226" name="Rettangolo 225">
+            <a:extLst>
+              <a:ext uri="{FF2B5EF4-FFF2-40B4-BE49-F238E27FC236}">
+                <a16:creationId xmlns:a16="http://schemas.microsoft.com/office/drawing/2014/main" id="{3F176E2E-F90F-C963-CBEE-92D22B2B1440}"/>
+              </a:ext>
+            </a:extLst>
+          </p:cNvPr>
+          <p:cNvSpPr/>
+          <p:nvPr/>
+        </p:nvSpPr>
+        <p:spPr>
+          <a:xfrm rot="5400000">
+            <a:off x="10645171" y="3055084"/>
+            <a:ext cx="1887799" cy="233402"/>
+          </a:xfrm>
+          <a:prstGeom prst="rect">
+            <a:avLst/>
+          </a:prstGeom>
+          <a:solidFill>
+            <a:schemeClr val="accent4">
+              <a:lumMod val="40000"/>
+              <a:lumOff val="60000"/>
+            </a:schemeClr>
+          </a:solidFill>
+        </p:spPr>
+        <p:style>
+          <a:lnRef idx="2">
+            <a:schemeClr val="accent1">
+              <a:shade val="15000"/>
+            </a:schemeClr>
+          </a:lnRef>
+          <a:fillRef idx="1">
+            <a:schemeClr val="accent1"/>
+          </a:fillRef>
+          <a:effectRef idx="0">
+            <a:schemeClr val="accent1"/>
+          </a:effectRef>
+          <a:fontRef idx="minor">
+            <a:schemeClr val="lt1"/>
+          </a:fontRef>
+        </p:style>
+        <p:txBody>
+          <a:bodyPr rtlCol="0" anchor="ctr"/>
+          <a:lstStyle/>
+          <a:p>
+            <a:pPr algn="ctr"/>
+            <a:r>
+              <a:rPr lang="it-IT" dirty="0">
+                <a:solidFill>
+                  <a:schemeClr val="tx1"/>
+                </a:solidFill>
+              </a:rPr>
+              <a:t>DECODER</a:t>
+            </a:r>
+          </a:p>
+        </p:txBody>
+      </p:sp>
+      <p:cxnSp>
+        <p:nvCxnSpPr>
+          <p:cNvPr id="227" name="Connettore 2 226">
+            <a:extLst>
+              <a:ext uri="{FF2B5EF4-FFF2-40B4-BE49-F238E27FC236}">
+                <a16:creationId xmlns:a16="http://schemas.microsoft.com/office/drawing/2014/main" id="{D29CF29F-C21B-0628-EB99-339AD364CCB6}"/>
+              </a:ext>
+            </a:extLst>
+          </p:cNvPr>
+          <p:cNvCxnSpPr>
+            <a:cxnSpLocks/>
+            <a:endCxn id="224" idx="2"/>
+          </p:cNvCxnSpPr>
+          <p:nvPr/>
+        </p:nvCxnSpPr>
+        <p:spPr>
+          <a:xfrm flipV="1">
+            <a:off x="10828870" y="3168313"/>
+            <a:ext cx="195261" cy="37234"/>
+          </a:xfrm>
+          <a:prstGeom prst="straightConnector1">
+            <a:avLst/>
+          </a:prstGeom>
+          <a:ln w="25400" cmpd="sng">
+            <a:tailEnd type="triangle"/>
+          </a:ln>
+        </p:spPr>
+        <p:style>
+          <a:lnRef idx="2">
+            <a:schemeClr val="dk1"/>
+          </a:lnRef>
+          <a:fillRef idx="0">
+            <a:schemeClr val="dk1"/>
+          </a:fillRef>
+          <a:effectRef idx="1">
+            <a:schemeClr val="dk1"/>
+          </a:effectRef>
+          <a:fontRef idx="minor">
+            <a:schemeClr val="tx1"/>
+          </a:fontRef>
+        </p:style>
+      </p:cxnSp>
+      <p:cxnSp>
+        <p:nvCxnSpPr>
+          <p:cNvPr id="229" name="Connettore 2 228">
+            <a:extLst>
+              <a:ext uri="{FF2B5EF4-FFF2-40B4-BE49-F238E27FC236}">
+                <a16:creationId xmlns:a16="http://schemas.microsoft.com/office/drawing/2014/main" id="{BE2EDFB6-C1AE-B3FA-554B-3847584FA768}"/>
+              </a:ext>
+            </a:extLst>
+          </p:cNvPr>
+          <p:cNvCxnSpPr>
+            <a:cxnSpLocks/>
+            <a:stCxn id="224" idx="0"/>
+            <a:endCxn id="226" idx="2"/>
+          </p:cNvCxnSpPr>
+          <p:nvPr/>
+        </p:nvCxnSpPr>
+        <p:spPr>
+          <a:xfrm>
+            <a:off x="11257533" y="3168313"/>
+            <a:ext cx="214837" cy="3473"/>
+          </a:xfrm>
+          <a:prstGeom prst="straightConnector1">
+            <a:avLst/>
+          </a:prstGeom>
+          <a:ln w="25400" cmpd="sng">
+            <a:tailEnd type="triangle"/>
+          </a:ln>
+        </p:spPr>
+        <p:style>
+          <a:lnRef idx="2">
+            <a:schemeClr val="dk1"/>
+          </a:lnRef>
+          <a:fillRef idx="0">
+            <a:schemeClr val="dk1"/>
+          </a:fillRef>
+          <a:effectRef idx="1">
+            <a:schemeClr val="dk1"/>
+          </a:effectRef>
+          <a:fontRef idx="minor">
+            <a:schemeClr val="tx1"/>
+          </a:fontRef>
+        </p:style>
+      </p:cxnSp>
+      <p:cxnSp>
+        <p:nvCxnSpPr>
+          <p:cNvPr id="233" name="Connettore 2 232">
+            <a:extLst>
+              <a:ext uri="{FF2B5EF4-FFF2-40B4-BE49-F238E27FC236}">
+                <a16:creationId xmlns:a16="http://schemas.microsoft.com/office/drawing/2014/main" id="{15E985E9-EA54-E531-A863-A45549CF8C16}"/>
+              </a:ext>
+            </a:extLst>
+          </p:cNvPr>
+          <p:cNvCxnSpPr>
+            <a:cxnSpLocks/>
+            <a:endCxn id="224" idx="1"/>
+          </p:cNvCxnSpPr>
+          <p:nvPr/>
+        </p:nvCxnSpPr>
+        <p:spPr>
+          <a:xfrm>
+            <a:off x="11128174" y="1362180"/>
+            <a:ext cx="12658" cy="862233"/>
+          </a:xfrm>
+          <a:prstGeom prst="straightConnector1">
+            <a:avLst/>
+          </a:prstGeom>
+          <a:ln w="25400" cmpd="sng">
+            <a:tailEnd type="triangle"/>
+          </a:ln>
+        </p:spPr>
+        <p:style>
+          <a:lnRef idx="2">
+            <a:schemeClr val="dk1"/>
+          </a:lnRef>
+          <a:fillRef idx="0">
+            <a:schemeClr val="dk1"/>
+          </a:fillRef>
+          <a:effectRef idx="1">
+            <a:schemeClr val="dk1"/>
+          </a:effectRef>
+          <a:fontRef idx="minor">
+            <a:schemeClr val="tx1"/>
+          </a:fontRef>
+        </p:style>
+      </p:cxnSp>
+      <p:cxnSp>
+        <p:nvCxnSpPr>
+          <p:cNvPr id="236" name="Connettore 2 235">
+            <a:extLst>
+              <a:ext uri="{FF2B5EF4-FFF2-40B4-BE49-F238E27FC236}">
+                <a16:creationId xmlns:a16="http://schemas.microsoft.com/office/drawing/2014/main" id="{1B82C16B-F0E4-85E9-DCFF-84398C2EA744}"/>
+              </a:ext>
+            </a:extLst>
+          </p:cNvPr>
+          <p:cNvCxnSpPr>
+            <a:cxnSpLocks/>
+          </p:cNvCxnSpPr>
+          <p:nvPr/>
+        </p:nvCxnSpPr>
+        <p:spPr>
+          <a:xfrm>
+            <a:off x="11607157" y="1362179"/>
+            <a:ext cx="12658" cy="862233"/>
+          </a:xfrm>
+          <a:prstGeom prst="straightConnector1">
+            <a:avLst/>
+          </a:prstGeom>
+          <a:ln w="25400" cmpd="sng">
+            <a:tailEnd type="triangle"/>
+          </a:ln>
+        </p:spPr>
+        <p:style>
+          <a:lnRef idx="2">
+            <a:schemeClr val="dk1"/>
+          </a:lnRef>
+          <a:fillRef idx="0">
+            <a:schemeClr val="dk1"/>
+          </a:fillRef>
+          <a:effectRef idx="1">
+            <a:schemeClr val="dk1"/>
+          </a:effectRef>
+          <a:fontRef idx="minor">
+            <a:schemeClr val="tx1"/>
+          </a:fontRef>
+        </p:style>
+      </p:cxnSp>
+      <p:cxnSp>
+        <p:nvCxnSpPr>
+          <p:cNvPr id="237" name="Connettore 4 236">
+            <a:extLst>
+              <a:ext uri="{FF2B5EF4-FFF2-40B4-BE49-F238E27FC236}">
+                <a16:creationId xmlns:a16="http://schemas.microsoft.com/office/drawing/2014/main" id="{2671BB42-BBD7-2B98-ECD7-8A20A8560616}"/>
+              </a:ext>
+            </a:extLst>
+          </p:cNvPr>
+          <p:cNvCxnSpPr>
+            <a:cxnSpLocks/>
+            <a:endCxn id="251" idx="1"/>
+          </p:cNvCxnSpPr>
+          <p:nvPr/>
+        </p:nvCxnSpPr>
+        <p:spPr>
+          <a:xfrm rot="16200000" flipH="1">
+            <a:off x="5337343" y="4440497"/>
+            <a:ext cx="1081744" cy="609782"/>
+          </a:xfrm>
+          <a:prstGeom prst="bentConnector2">
+            <a:avLst/>
+          </a:prstGeom>
+          <a:ln>
+            <a:tailEnd type="triangle"/>
+          </a:ln>
+        </p:spPr>
+        <p:style>
+          <a:lnRef idx="3">
+            <a:schemeClr val="dk1"/>
+          </a:lnRef>
+          <a:fillRef idx="0">
+            <a:schemeClr val="dk1"/>
+          </a:fillRef>
+          <a:effectRef idx="2">
+            <a:schemeClr val="dk1"/>
+          </a:effectRef>
+          <a:fontRef idx="minor">
+            <a:schemeClr val="tx1"/>
+          </a:fontRef>
+        </p:style>
+      </p:cxnSp>
+      <p:sp>
+        <p:nvSpPr>
+          <p:cNvPr id="251" name="Rettangolo 250">
+            <a:extLst>
+              <a:ext uri="{FF2B5EF4-FFF2-40B4-BE49-F238E27FC236}">
+                <a16:creationId xmlns:a16="http://schemas.microsoft.com/office/drawing/2014/main" id="{F12DBB60-BC72-D095-D9B6-A321052E17E3}"/>
+              </a:ext>
+            </a:extLst>
+          </p:cNvPr>
+          <p:cNvSpPr/>
+          <p:nvPr/>
+        </p:nvSpPr>
+        <p:spPr>
+          <a:xfrm>
+            <a:off x="6183106" y="4981847"/>
+            <a:ext cx="400497" cy="608826"/>
+          </a:xfrm>
+          <a:prstGeom prst="rect">
+            <a:avLst/>
+          </a:prstGeom>
+          <a:solidFill>
+            <a:schemeClr val="accent2">
+              <a:lumMod val="60000"/>
+              <a:lumOff val="40000"/>
+            </a:schemeClr>
+          </a:solidFill>
+        </p:spPr>
+        <p:style>
+          <a:lnRef idx="2">
+            <a:schemeClr val="accent1">
+              <a:shade val="15000"/>
+            </a:schemeClr>
+          </a:lnRef>
+          <a:fillRef idx="1">
+            <a:schemeClr val="accent1"/>
+          </a:fillRef>
+          <a:effectRef idx="0">
+            <a:schemeClr val="accent1"/>
+          </a:effectRef>
+          <a:fontRef idx="minor">
+            <a:schemeClr val="lt1"/>
+          </a:fontRef>
+        </p:style>
+        <p:txBody>
+          <a:bodyPr rtlCol="0" anchor="ctr"/>
+          <a:lstStyle/>
+          <a:p>
+            <a:pPr algn="ctr"/>
+            <a:endParaRPr lang="it-IT"/>
+          </a:p>
+        </p:txBody>
+      </p:sp>
+      <p:sp>
+        <p:nvSpPr>
+          <p:cNvPr id="252" name="Rettangolo 251">
+            <a:extLst>
+              <a:ext uri="{FF2B5EF4-FFF2-40B4-BE49-F238E27FC236}">
+                <a16:creationId xmlns:a16="http://schemas.microsoft.com/office/drawing/2014/main" id="{04D9A84B-4E0C-39F4-FA33-D30E27F5B044}"/>
+              </a:ext>
+            </a:extLst>
+          </p:cNvPr>
+          <p:cNvSpPr/>
+          <p:nvPr/>
+        </p:nvSpPr>
+        <p:spPr>
+          <a:xfrm rot="5400000">
+            <a:off x="6126596" y="5038354"/>
+            <a:ext cx="271806" cy="158793"/>
+          </a:xfrm>
+          <a:prstGeom prst="rect">
+            <a:avLst/>
+          </a:prstGeom>
+          <a:solidFill>
+            <a:schemeClr val="accent2"/>
+          </a:solidFill>
+        </p:spPr>
+        <p:style>
+          <a:lnRef idx="2">
+            <a:schemeClr val="accent1">
+              <a:shade val="15000"/>
+            </a:schemeClr>
+          </a:lnRef>
+          <a:fillRef idx="1">
+            <a:schemeClr val="accent1"/>
+          </a:fillRef>
+          <a:effectRef idx="0">
+            <a:schemeClr val="accent1"/>
+          </a:effectRef>
+          <a:fontRef idx="minor">
+            <a:schemeClr val="lt1"/>
+          </a:fontRef>
+        </p:style>
+        <p:txBody>
+          <a:bodyPr rtlCol="0" anchor="ctr"/>
+          <a:lstStyle/>
+          <a:p>
+            <a:pPr algn="ctr"/>
+            <a:endParaRPr lang="it-IT" sz="1100" b="1" dirty="0">
+              <a:solidFill>
+                <a:schemeClr val="tx1"/>
+              </a:solidFill>
+            </a:endParaRPr>
+          </a:p>
+        </p:txBody>
+      </p:sp>
+      <p:sp>
+        <p:nvSpPr>
+          <p:cNvPr id="253" name="Rettangolo 252">
+            <a:extLst>
+              <a:ext uri="{FF2B5EF4-FFF2-40B4-BE49-F238E27FC236}">
+                <a16:creationId xmlns:a16="http://schemas.microsoft.com/office/drawing/2014/main" id="{923692F7-78C7-0471-5A56-C0D859AE8DA9}"/>
+              </a:ext>
+            </a:extLst>
+          </p:cNvPr>
+          <p:cNvSpPr/>
+          <p:nvPr/>
+        </p:nvSpPr>
+        <p:spPr>
+          <a:xfrm rot="5400000">
+            <a:off x="6252782" y="5212230"/>
+            <a:ext cx="271806" cy="204079"/>
+          </a:xfrm>
+          <a:prstGeom prst="rect">
+            <a:avLst/>
+          </a:prstGeom>
+          <a:solidFill>
+            <a:srgbClr val="0096FF"/>
+          </a:solidFill>
+        </p:spPr>
+        <p:style>
+          <a:lnRef idx="2">
+            <a:schemeClr val="accent1">
+              <a:shade val="15000"/>
+            </a:schemeClr>
+          </a:lnRef>
+          <a:fillRef idx="1">
+            <a:schemeClr val="accent1"/>
+          </a:fillRef>
+          <a:effectRef idx="0">
+            <a:schemeClr val="accent1"/>
+          </a:effectRef>
+          <a:fontRef idx="minor">
+            <a:schemeClr val="lt1"/>
+          </a:fontRef>
+        </p:style>
+        <p:txBody>
+          <a:bodyPr rtlCol="0" anchor="ctr"/>
+          <a:lstStyle/>
+          <a:p>
+            <a:pPr algn="ctr"/>
+            <a:endParaRPr lang="it-IT" sz="1300" b="1" dirty="0">
+              <a:solidFill>
+                <a:schemeClr val="tx1"/>
+              </a:solidFill>
+            </a:endParaRPr>
+          </a:p>
+        </p:txBody>
+      </p:sp>
+      <p:sp>
+        <p:nvSpPr>
+          <p:cNvPr id="254" name="Rettangolo 253">
+            <a:extLst>
+              <a:ext uri="{FF2B5EF4-FFF2-40B4-BE49-F238E27FC236}">
+                <a16:creationId xmlns:a16="http://schemas.microsoft.com/office/drawing/2014/main" id="{C6C5BE8C-57A8-6306-1DEC-417B68CCECEE}"/>
+              </a:ext>
+            </a:extLst>
+          </p:cNvPr>
+          <p:cNvSpPr/>
+          <p:nvPr/>
+        </p:nvSpPr>
+        <p:spPr>
+          <a:xfrm rot="5400000">
+            <a:off x="6413605" y="5420675"/>
+            <a:ext cx="181202" cy="158793"/>
+          </a:xfrm>
+          <a:prstGeom prst="rect">
+            <a:avLst/>
+          </a:prstGeom>
+          <a:solidFill>
+            <a:srgbClr val="FFFD78"/>
+          </a:solidFill>
+        </p:spPr>
+        <p:style>
+          <a:lnRef idx="2">
+            <a:schemeClr val="accent1">
+              <a:shade val="15000"/>
+            </a:schemeClr>
+          </a:lnRef>
+          <a:fillRef idx="1">
+            <a:schemeClr val="accent1"/>
+          </a:fillRef>
+          <a:effectRef idx="0">
+            <a:schemeClr val="accent1"/>
+          </a:effectRef>
+          <a:fontRef idx="minor">
+            <a:schemeClr val="lt1"/>
+          </a:fontRef>
+        </p:style>
+        <p:txBody>
+          <a:bodyPr rtlCol="0" anchor="ctr"/>
+          <a:lstStyle/>
+          <a:p>
+            <a:pPr algn="ctr"/>
+            <a:endParaRPr lang="it-IT" sz="1100" b="1" dirty="0">
+              <a:solidFill>
+                <a:schemeClr val="tx1"/>
+              </a:solidFill>
+            </a:endParaRPr>
+          </a:p>
+        </p:txBody>
+      </p:sp>
+      <p:cxnSp>
+        <p:nvCxnSpPr>
+          <p:cNvPr id="262" name="Connettore 4 261">
+            <a:extLst>
+              <a:ext uri="{FF2B5EF4-FFF2-40B4-BE49-F238E27FC236}">
+                <a16:creationId xmlns:a16="http://schemas.microsoft.com/office/drawing/2014/main" id="{9F10690C-33E0-2A59-B8E1-FBDF6B1A8FCA}"/>
+              </a:ext>
+            </a:extLst>
+          </p:cNvPr>
+          <p:cNvCxnSpPr>
+            <a:cxnSpLocks/>
+            <a:endCxn id="224" idx="3"/>
+          </p:cNvCxnSpPr>
+          <p:nvPr/>
+        </p:nvCxnSpPr>
+        <p:spPr>
+          <a:xfrm flipV="1">
+            <a:off x="6587094" y="4112212"/>
+            <a:ext cx="4553738" cy="1169990"/>
+          </a:xfrm>
+          <a:prstGeom prst="bentConnector2">
+            <a:avLst/>
+          </a:prstGeom>
+          <a:ln>
+            <a:tailEnd type="triangle"/>
+          </a:ln>
+        </p:spPr>
+        <p:style>
+          <a:lnRef idx="3">
+            <a:schemeClr val="dk1"/>
+          </a:lnRef>
+          <a:fillRef idx="0">
+            <a:schemeClr val="dk1"/>
+          </a:fillRef>
+          <a:effectRef idx="2">
+            <a:schemeClr val="dk1"/>
+          </a:effectRef>
+          <a:fontRef idx="minor">
+            <a:schemeClr val="tx1"/>
+          </a:fontRef>
+        </p:style>
+      </p:cxnSp>
+      <p:cxnSp>
+        <p:nvCxnSpPr>
+          <p:cNvPr id="267" name="Connettore 4 266">
+            <a:extLst>
+              <a:ext uri="{FF2B5EF4-FFF2-40B4-BE49-F238E27FC236}">
+                <a16:creationId xmlns:a16="http://schemas.microsoft.com/office/drawing/2014/main" id="{6A6326BF-F5C0-57CF-B66D-780509772285}"/>
+              </a:ext>
+            </a:extLst>
+          </p:cNvPr>
+          <p:cNvCxnSpPr>
+            <a:cxnSpLocks/>
+            <a:endCxn id="226" idx="3"/>
+          </p:cNvCxnSpPr>
+          <p:nvPr/>
+        </p:nvCxnSpPr>
+        <p:spPr>
+          <a:xfrm flipV="1">
+            <a:off x="5186798" y="4115685"/>
+            <a:ext cx="6402273" cy="2299755"/>
+          </a:xfrm>
+          <a:prstGeom prst="bentConnector2">
+            <a:avLst/>
+          </a:prstGeom>
+          <a:ln>
+            <a:tailEnd type="triangle"/>
+          </a:ln>
+        </p:spPr>
+        <p:style>
+          <a:lnRef idx="3">
+            <a:schemeClr val="dk1"/>
+          </a:lnRef>
+          <a:fillRef idx="0">
+            <a:schemeClr val="dk1"/>
+          </a:fillRef>
+          <a:effectRef idx="2">
+            <a:schemeClr val="dk1"/>
+          </a:effectRef>
+          <a:fontRef idx="minor">
+            <a:schemeClr val="tx1"/>
+          </a:fontRef>
+        </p:style>
+      </p:cxnSp>
+      <p:sp>
+        <p:nvSpPr>
+          <p:cNvPr id="270" name="Rettangolo 269">
+            <a:extLst>
+              <a:ext uri="{FF2B5EF4-FFF2-40B4-BE49-F238E27FC236}">
+                <a16:creationId xmlns:a16="http://schemas.microsoft.com/office/drawing/2014/main" id="{E915A68D-D2CE-7DDC-C41D-BE9552DC47D7}"/>
+              </a:ext>
+            </a:extLst>
+          </p:cNvPr>
+          <p:cNvSpPr/>
+          <p:nvPr/>
+        </p:nvSpPr>
+        <p:spPr>
+          <a:xfrm rot="5400000">
+            <a:off x="11566218" y="3079590"/>
+            <a:ext cx="881869" cy="173091"/>
+          </a:xfrm>
+          <a:prstGeom prst="rect">
+            <a:avLst/>
+          </a:prstGeom>
+          <a:solidFill>
+            <a:schemeClr val="accent2"/>
+          </a:solidFill>
+        </p:spPr>
+        <p:style>
+          <a:lnRef idx="2">
+            <a:schemeClr val="accent1">
+              <a:shade val="15000"/>
+            </a:schemeClr>
+          </a:lnRef>
+          <a:fillRef idx="1">
+            <a:schemeClr val="accent1"/>
+          </a:fillRef>
+          <a:effectRef idx="0">
+            <a:schemeClr val="accent1"/>
+          </a:effectRef>
+          <a:fontRef idx="minor">
+            <a:schemeClr val="lt1"/>
+          </a:fontRef>
+        </p:style>
+        <p:txBody>
+          <a:bodyPr rtlCol="0" anchor="ctr"/>
+          <a:lstStyle/>
+          <a:p>
+            <a:pPr algn="ctr"/>
+            <a:r>
+              <a:rPr lang="it-IT" sz="1300" b="1" dirty="0">
+                <a:solidFill>
+                  <a:schemeClr val="tx1"/>
+                </a:solidFill>
+              </a:rPr>
+              <a:t>Conv2D</a:t>
+            </a:r>
+          </a:p>
+        </p:txBody>
+      </p:sp>
+      <p:cxnSp>
+        <p:nvCxnSpPr>
+          <p:cNvPr id="274" name="Connettore 2 273">
+            <a:extLst>
+              <a:ext uri="{FF2B5EF4-FFF2-40B4-BE49-F238E27FC236}">
+                <a16:creationId xmlns:a16="http://schemas.microsoft.com/office/drawing/2014/main" id="{057AFB57-BC41-43AD-A8C3-574F0B45C0E7}"/>
+              </a:ext>
+            </a:extLst>
+          </p:cNvPr>
+          <p:cNvCxnSpPr>
+            <a:cxnSpLocks/>
+          </p:cNvCxnSpPr>
+          <p:nvPr/>
+        </p:nvCxnSpPr>
+        <p:spPr>
+          <a:xfrm flipV="1">
+            <a:off x="11716955" y="3156171"/>
+            <a:ext cx="203653" cy="22121"/>
+          </a:xfrm>
+          <a:prstGeom prst="straightConnector1">
+            <a:avLst/>
+          </a:prstGeom>
+          <a:ln w="25400" cmpd="sng">
+            <a:tailEnd type="triangle"/>
+          </a:ln>
+        </p:spPr>
+        <p:style>
+          <a:lnRef idx="2">
+            <a:schemeClr val="dk1"/>
+          </a:lnRef>
+          <a:fillRef idx="0">
+            <a:schemeClr val="dk1"/>
+          </a:fillRef>
+          <a:effectRef idx="1">
+            <a:schemeClr val="dk1"/>
+          </a:effectRef>
+          <a:fontRef idx="minor">
+            <a:schemeClr val="tx1"/>
+          </a:fontRef>
+        </p:style>
+      </p:cxnSp>
+      <p:sp>
+        <p:nvSpPr>
+          <p:cNvPr id="29" name="Rettangolo 28">
+            <a:extLst>
+              <a:ext uri="{FF2B5EF4-FFF2-40B4-BE49-F238E27FC236}">
+                <a16:creationId xmlns:a16="http://schemas.microsoft.com/office/drawing/2014/main" id="{D01F2C00-49AA-ED77-D6FE-FF59AB4A2778}"/>
+              </a:ext>
+            </a:extLst>
+          </p:cNvPr>
+          <p:cNvSpPr/>
+          <p:nvPr/>
+        </p:nvSpPr>
+        <p:spPr>
+          <a:xfrm>
+            <a:off x="1706124" y="2071002"/>
+            <a:ext cx="3309199" cy="2374566"/>
+          </a:xfrm>
+          <a:prstGeom prst="rect">
+            <a:avLst/>
+          </a:prstGeom>
+          <a:solidFill>
+            <a:schemeClr val="bg1">
+              <a:lumMod val="75000"/>
+            </a:schemeClr>
+          </a:solidFill>
+        </p:spPr>
+        <p:style>
+          <a:lnRef idx="2">
+            <a:schemeClr val="accent1">
+              <a:shade val="15000"/>
+            </a:schemeClr>
+          </a:lnRef>
+          <a:fillRef idx="1">
+            <a:schemeClr val="accent1"/>
+          </a:fillRef>
+          <a:effectRef idx="0">
+            <a:schemeClr val="accent1"/>
+          </a:effectRef>
+          <a:fontRef idx="minor">
+            <a:schemeClr val="lt1"/>
+          </a:fontRef>
+        </p:style>
+        <p:txBody>
+          <a:bodyPr rtlCol="0" anchor="ctr"/>
+          <a:lstStyle/>
+          <a:p>
+            <a:pPr algn="ctr"/>
+            <a:endParaRPr lang="it-IT" dirty="0"/>
+          </a:p>
+        </p:txBody>
+      </p:sp>
+      <p:sp>
+        <p:nvSpPr>
+          <p:cNvPr id="30" name="Rettangolo 29">
+            <a:extLst>
+              <a:ext uri="{FF2B5EF4-FFF2-40B4-BE49-F238E27FC236}">
+                <a16:creationId xmlns:a16="http://schemas.microsoft.com/office/drawing/2014/main" id="{71B9676C-D8CE-9C66-8607-07700F6514C9}"/>
+              </a:ext>
+            </a:extLst>
+          </p:cNvPr>
+          <p:cNvSpPr/>
+          <p:nvPr/>
+        </p:nvSpPr>
+        <p:spPr>
+          <a:xfrm rot="5400000">
+            <a:off x="398614" y="3108670"/>
+            <a:ext cx="1543185" cy="306098"/>
+          </a:xfrm>
+          <a:prstGeom prst="rect">
+            <a:avLst/>
+          </a:prstGeom>
+          <a:solidFill>
+            <a:schemeClr val="accent2"/>
+          </a:solidFill>
+        </p:spPr>
+        <p:style>
+          <a:lnRef idx="2">
+            <a:schemeClr val="accent1">
+              <a:shade val="15000"/>
+            </a:schemeClr>
+          </a:lnRef>
+          <a:fillRef idx="1">
+            <a:schemeClr val="accent1"/>
+          </a:fillRef>
+          <a:effectRef idx="0">
+            <a:schemeClr val="accent1"/>
+          </a:effectRef>
+          <a:fontRef idx="minor">
+            <a:schemeClr val="lt1"/>
+          </a:fontRef>
+        </p:style>
+        <p:txBody>
+          <a:bodyPr rtlCol="0" anchor="ctr"/>
+          <a:lstStyle/>
+          <a:p>
+            <a:pPr algn="ctr"/>
+            <a:r>
+              <a:rPr lang="it-IT" sz="2500" b="1" dirty="0">
+                <a:solidFill>
+                  <a:schemeClr val="tx1"/>
+                </a:solidFill>
+              </a:rPr>
+              <a:t>Conv2D</a:t>
+            </a:r>
+          </a:p>
+        </p:txBody>
+      </p:sp>
+      <p:cxnSp>
+        <p:nvCxnSpPr>
+          <p:cNvPr id="31" name="Connettore 2 30">
+            <a:extLst>
+              <a:ext uri="{FF2B5EF4-FFF2-40B4-BE49-F238E27FC236}">
+                <a16:creationId xmlns:a16="http://schemas.microsoft.com/office/drawing/2014/main" id="{BFCCAA6C-45FD-3C9E-E7C0-2B650E8CB61C}"/>
+              </a:ext>
+            </a:extLst>
+          </p:cNvPr>
+          <p:cNvCxnSpPr>
+            <a:cxnSpLocks/>
+            <a:endCxn id="30" idx="2"/>
+          </p:cNvCxnSpPr>
+          <p:nvPr/>
+        </p:nvCxnSpPr>
+        <p:spPr>
+          <a:xfrm>
+            <a:off x="603004" y="3238097"/>
+            <a:ext cx="414154" cy="23623"/>
+          </a:xfrm>
+          <a:prstGeom prst="straightConnector1">
+            <a:avLst/>
+          </a:prstGeom>
+          <a:ln w="25400" cmpd="sng">
+            <a:tailEnd type="triangle"/>
+          </a:ln>
+        </p:spPr>
+        <p:style>
+          <a:lnRef idx="2">
+            <a:schemeClr val="dk1"/>
+          </a:lnRef>
+          <a:fillRef idx="0">
+            <a:schemeClr val="dk1"/>
+          </a:fillRef>
+          <a:effectRef idx="1">
+            <a:schemeClr val="dk1"/>
+          </a:effectRef>
+          <a:fontRef idx="minor">
+            <a:schemeClr val="tx1"/>
+          </a:fontRef>
+        </p:style>
+      </p:cxnSp>
+      <p:sp>
+        <p:nvSpPr>
+          <p:cNvPr id="32" name="Rettangolo 31">
+            <a:extLst>
+              <a:ext uri="{FF2B5EF4-FFF2-40B4-BE49-F238E27FC236}">
+                <a16:creationId xmlns:a16="http://schemas.microsoft.com/office/drawing/2014/main" id="{4A9DEA08-8E07-4F7E-2128-4BF676E97639}"/>
+              </a:ext>
+            </a:extLst>
+          </p:cNvPr>
+          <p:cNvSpPr/>
+          <p:nvPr/>
+        </p:nvSpPr>
+        <p:spPr>
+          <a:xfrm>
+            <a:off x="1818941" y="2159740"/>
+            <a:ext cx="792574" cy="1830022"/>
+          </a:xfrm>
+          <a:prstGeom prst="rect">
+            <a:avLst/>
+          </a:prstGeom>
+          <a:solidFill>
+            <a:schemeClr val="accent2">
+              <a:lumMod val="60000"/>
+              <a:lumOff val="40000"/>
+            </a:schemeClr>
+          </a:solidFill>
+        </p:spPr>
+        <p:style>
+          <a:lnRef idx="2">
+            <a:schemeClr val="accent1">
+              <a:shade val="15000"/>
+            </a:schemeClr>
+          </a:lnRef>
+          <a:fillRef idx="1">
+            <a:schemeClr val="accent1"/>
+          </a:fillRef>
+          <a:effectRef idx="0">
+            <a:schemeClr val="accent1"/>
+          </a:effectRef>
+          <a:fontRef idx="minor">
+            <a:schemeClr val="lt1"/>
+          </a:fontRef>
+        </p:style>
+        <p:txBody>
+          <a:bodyPr rtlCol="0" anchor="ctr"/>
+          <a:lstStyle/>
+          <a:p>
+            <a:pPr algn="ctr"/>
+            <a:endParaRPr lang="it-IT"/>
+          </a:p>
+        </p:txBody>
+      </p:sp>
+      <p:sp>
+        <p:nvSpPr>
+          <p:cNvPr id="33" name="Rettangolo 32">
+            <a:extLst>
+              <a:ext uri="{FF2B5EF4-FFF2-40B4-BE49-F238E27FC236}">
+                <a16:creationId xmlns:a16="http://schemas.microsoft.com/office/drawing/2014/main" id="{B2FCB3A5-77BD-FA44-61AB-6D6A39DFC20F}"/>
+              </a:ext>
+            </a:extLst>
+          </p:cNvPr>
+          <p:cNvSpPr/>
+          <p:nvPr/>
+        </p:nvSpPr>
+        <p:spPr>
+          <a:xfrm rot="5400000">
+            <a:off x="1605482" y="2373197"/>
+            <a:ext cx="733013" cy="306098"/>
+          </a:xfrm>
+          <a:prstGeom prst="rect">
+            <a:avLst/>
+          </a:prstGeom>
+          <a:solidFill>
+            <a:schemeClr val="accent2"/>
+          </a:solidFill>
+        </p:spPr>
+        <p:style>
+          <a:lnRef idx="2">
+            <a:schemeClr val="accent1">
+              <a:shade val="15000"/>
+            </a:schemeClr>
+          </a:lnRef>
+          <a:fillRef idx="1">
+            <a:schemeClr val="accent1"/>
+          </a:fillRef>
+          <a:effectRef idx="0">
+            <a:schemeClr val="accent1"/>
+          </a:effectRef>
+          <a:fontRef idx="minor">
+            <a:schemeClr val="lt1"/>
+          </a:fontRef>
+        </p:style>
+        <p:txBody>
+          <a:bodyPr rtlCol="0" anchor="ctr"/>
+          <a:lstStyle/>
+          <a:p>
+            <a:pPr algn="ctr"/>
+            <a:r>
+              <a:rPr lang="it-IT" sz="1100" b="1" dirty="0">
+                <a:solidFill>
+                  <a:schemeClr val="tx1"/>
+                </a:solidFill>
+              </a:rPr>
+              <a:t>Conv2D</a:t>
+            </a:r>
+          </a:p>
+        </p:txBody>
+      </p:sp>
+      <p:sp>
+        <p:nvSpPr>
+          <p:cNvPr id="34" name="Rettangolo 33">
+            <a:extLst>
+              <a:ext uri="{FF2B5EF4-FFF2-40B4-BE49-F238E27FC236}">
+                <a16:creationId xmlns:a16="http://schemas.microsoft.com/office/drawing/2014/main" id="{A46F199E-BB24-029D-086A-590639149CEB}"/>
+              </a:ext>
+            </a:extLst>
+          </p:cNvPr>
+          <p:cNvSpPr/>
+          <p:nvPr/>
+        </p:nvSpPr>
+        <p:spPr>
+          <a:xfrm rot="5400000">
+            <a:off x="1868191" y="2986048"/>
+            <a:ext cx="733015" cy="393394"/>
+          </a:xfrm>
+          <a:prstGeom prst="rect">
+            <a:avLst/>
+          </a:prstGeom>
+          <a:solidFill>
+            <a:srgbClr val="0096FF"/>
+          </a:solidFill>
+        </p:spPr>
+        <p:style>
+          <a:lnRef idx="2">
+            <a:schemeClr val="accent1">
+              <a:shade val="15000"/>
+            </a:schemeClr>
+          </a:lnRef>
+          <a:fillRef idx="1">
+            <a:schemeClr val="accent1"/>
+          </a:fillRef>
+          <a:effectRef idx="0">
+            <a:schemeClr val="accent1"/>
+          </a:effectRef>
+          <a:fontRef idx="minor">
+            <a:schemeClr val="lt1"/>
+          </a:fontRef>
+        </p:style>
+        <p:txBody>
+          <a:bodyPr rtlCol="0" anchor="ctr"/>
+          <a:lstStyle/>
+          <a:p>
+            <a:pPr algn="ctr"/>
+            <a:r>
+              <a:rPr lang="it-IT" sz="1300" b="1" dirty="0">
+                <a:solidFill>
+                  <a:schemeClr val="tx1"/>
+                </a:solidFill>
+              </a:rPr>
+              <a:t>Batch </a:t>
+            </a:r>
+            <a:r>
+              <a:rPr lang="it-IT" sz="1300" b="1" dirty="0" err="1">
+                <a:solidFill>
+                  <a:schemeClr val="tx1"/>
+                </a:solidFill>
+              </a:rPr>
+              <a:t>Nrom</a:t>
+            </a:r>
+            <a:endParaRPr lang="it-IT" sz="1300" b="1" dirty="0">
+              <a:solidFill>
+                <a:schemeClr val="tx1"/>
+              </a:solidFill>
+            </a:endParaRPr>
+          </a:p>
+        </p:txBody>
+      </p:sp>
+      <p:sp>
+        <p:nvSpPr>
+          <p:cNvPr id="35" name="Rettangolo 34">
+            <a:extLst>
+              <a:ext uri="{FF2B5EF4-FFF2-40B4-BE49-F238E27FC236}">
+                <a16:creationId xmlns:a16="http://schemas.microsoft.com/office/drawing/2014/main" id="{D9514D68-B797-8D7E-AC15-6BABA4D60908}"/>
+              </a:ext>
+            </a:extLst>
+          </p:cNvPr>
+          <p:cNvSpPr/>
+          <p:nvPr/>
+        </p:nvSpPr>
+        <p:spPr>
+          <a:xfrm rot="5400000">
+            <a:off x="2214131" y="3584031"/>
+            <a:ext cx="488672" cy="306098"/>
+          </a:xfrm>
+          <a:prstGeom prst="rect">
+            <a:avLst/>
+          </a:prstGeom>
+          <a:solidFill>
+            <a:srgbClr val="FFFD78"/>
+          </a:solidFill>
+        </p:spPr>
+        <p:style>
+          <a:lnRef idx="2">
+            <a:schemeClr val="accent1">
+              <a:shade val="15000"/>
+            </a:schemeClr>
+          </a:lnRef>
+          <a:fillRef idx="1">
+            <a:schemeClr val="accent1"/>
+          </a:fillRef>
+          <a:effectRef idx="0">
+            <a:schemeClr val="accent1"/>
+          </a:effectRef>
+          <a:fontRef idx="minor">
+            <a:schemeClr val="lt1"/>
+          </a:fontRef>
+        </p:style>
+        <p:txBody>
+          <a:bodyPr rtlCol="0" anchor="ctr"/>
+          <a:lstStyle/>
+          <a:p>
+            <a:pPr algn="ctr"/>
+            <a:r>
+              <a:rPr lang="it-IT" sz="1100" b="1" dirty="0" err="1">
+                <a:solidFill>
+                  <a:schemeClr val="tx1"/>
+                </a:solidFill>
+              </a:rPr>
+              <a:t>Relu</a:t>
+            </a:r>
+            <a:endParaRPr lang="it-IT" sz="1100" b="1" dirty="0">
+              <a:solidFill>
+                <a:schemeClr val="tx1"/>
+              </a:solidFill>
+            </a:endParaRPr>
+          </a:p>
+        </p:txBody>
+      </p:sp>
+      <p:sp>
+        <p:nvSpPr>
+          <p:cNvPr id="36" name="Rettangolo 35">
+            <a:extLst>
+              <a:ext uri="{FF2B5EF4-FFF2-40B4-BE49-F238E27FC236}">
+                <a16:creationId xmlns:a16="http://schemas.microsoft.com/office/drawing/2014/main" id="{320D5DE2-014E-E7BB-B00D-05434708D234}"/>
+              </a:ext>
+            </a:extLst>
+          </p:cNvPr>
+          <p:cNvSpPr/>
+          <p:nvPr/>
+        </p:nvSpPr>
+        <p:spPr>
+          <a:xfrm>
+            <a:off x="45719" y="783985"/>
+            <a:ext cx="359481" cy="429419"/>
+          </a:xfrm>
+          <a:prstGeom prst="rect">
+            <a:avLst/>
+          </a:prstGeom>
+          <a:solidFill>
+            <a:schemeClr val="accent5">
+              <a:lumMod val="60000"/>
+              <a:lumOff val="40000"/>
+            </a:schemeClr>
+          </a:solidFill>
+        </p:spPr>
+        <p:style>
+          <a:lnRef idx="2">
+            <a:schemeClr val="accent1">
+              <a:shade val="15000"/>
+            </a:schemeClr>
+          </a:lnRef>
+          <a:fillRef idx="1">
+            <a:schemeClr val="accent1"/>
+          </a:fillRef>
+          <a:effectRef idx="0">
+            <a:schemeClr val="accent1"/>
+          </a:effectRef>
+          <a:fontRef idx="minor">
+            <a:schemeClr val="lt1"/>
+          </a:fontRef>
+        </p:style>
+        <p:txBody>
+          <a:bodyPr rtlCol="0" anchor="ctr"/>
+          <a:lstStyle/>
+          <a:p>
+            <a:pPr algn="ctr"/>
+            <a:r>
+              <a:rPr lang="it-IT" sz="2500" dirty="0">
+                <a:solidFill>
+                  <a:schemeClr val="tx1"/>
+                </a:solidFill>
+              </a:rPr>
+              <a:t>t</a:t>
+            </a:r>
+          </a:p>
+        </p:txBody>
+      </p:sp>
+      <p:cxnSp>
+        <p:nvCxnSpPr>
+          <p:cNvPr id="38" name="Connettore 2 37">
+            <a:extLst>
+              <a:ext uri="{FF2B5EF4-FFF2-40B4-BE49-F238E27FC236}">
+                <a16:creationId xmlns:a16="http://schemas.microsoft.com/office/drawing/2014/main" id="{FF806B8F-5449-09BE-DA82-2BD80A4AAC40}"/>
+              </a:ext>
+            </a:extLst>
+          </p:cNvPr>
+          <p:cNvCxnSpPr>
+            <a:cxnSpLocks/>
+          </p:cNvCxnSpPr>
+          <p:nvPr/>
+        </p:nvCxnSpPr>
+        <p:spPr>
+          <a:xfrm>
+            <a:off x="405200" y="983900"/>
+            <a:ext cx="253281" cy="0"/>
+          </a:xfrm>
+          <a:prstGeom prst="straightConnector1">
+            <a:avLst/>
+          </a:prstGeom>
+          <a:ln w="25400" cmpd="sng">
+            <a:tailEnd type="triangle"/>
+          </a:ln>
+        </p:spPr>
+        <p:style>
+          <a:lnRef idx="2">
+            <a:schemeClr val="dk1"/>
+          </a:lnRef>
+          <a:fillRef idx="0">
+            <a:schemeClr val="dk1"/>
+          </a:fillRef>
+          <a:effectRef idx="1">
+            <a:schemeClr val="dk1"/>
+          </a:effectRef>
+          <a:fontRef idx="minor">
+            <a:schemeClr val="tx1"/>
+          </a:fontRef>
+        </p:style>
+      </p:cxnSp>
+      <p:sp>
+        <p:nvSpPr>
+          <p:cNvPr id="39" name="Rettangolo 38">
+            <a:extLst>
+              <a:ext uri="{FF2B5EF4-FFF2-40B4-BE49-F238E27FC236}">
+                <a16:creationId xmlns:a16="http://schemas.microsoft.com/office/drawing/2014/main" id="{D10390E3-D428-78E3-0C9C-934C838FD7D6}"/>
+              </a:ext>
+            </a:extLst>
+          </p:cNvPr>
+          <p:cNvSpPr/>
+          <p:nvPr/>
+        </p:nvSpPr>
+        <p:spPr>
+          <a:xfrm>
+            <a:off x="648690" y="755460"/>
+            <a:ext cx="879238" cy="468002"/>
+          </a:xfrm>
+          <a:prstGeom prst="rect">
+            <a:avLst/>
+          </a:prstGeom>
+          <a:solidFill>
+            <a:schemeClr val="accent5">
+              <a:lumMod val="60000"/>
+              <a:lumOff val="40000"/>
+            </a:schemeClr>
+          </a:solidFill>
+        </p:spPr>
+        <p:style>
+          <a:lnRef idx="2">
+            <a:schemeClr val="accent1">
+              <a:shade val="15000"/>
+            </a:schemeClr>
+          </a:lnRef>
+          <a:fillRef idx="1">
+            <a:schemeClr val="accent1"/>
+          </a:fillRef>
+          <a:effectRef idx="0">
+            <a:schemeClr val="accent1"/>
+          </a:effectRef>
+          <a:fontRef idx="minor">
+            <a:schemeClr val="lt1"/>
+          </a:fontRef>
+        </p:style>
+        <p:txBody>
+          <a:bodyPr rtlCol="0" anchor="ctr"/>
+          <a:lstStyle/>
+          <a:p>
+            <a:pPr algn="ctr"/>
+            <a:r>
+              <a:rPr lang="it-IT" sz="1300" dirty="0">
+                <a:solidFill>
+                  <a:schemeClr val="tx1"/>
+                </a:solidFill>
+              </a:rPr>
+              <a:t>Pos Encoding</a:t>
+            </a:r>
+          </a:p>
+        </p:txBody>
+      </p:sp>
+      <p:sp>
+        <p:nvSpPr>
+          <p:cNvPr id="40" name="Rettangolo 39">
+            <a:extLst>
+              <a:ext uri="{FF2B5EF4-FFF2-40B4-BE49-F238E27FC236}">
+                <a16:creationId xmlns:a16="http://schemas.microsoft.com/office/drawing/2014/main" id="{200164F5-9730-F058-C4F0-A0B9C572C9B5}"/>
+              </a:ext>
+            </a:extLst>
+          </p:cNvPr>
+          <p:cNvSpPr/>
+          <p:nvPr/>
+        </p:nvSpPr>
+        <p:spPr>
+          <a:xfrm>
+            <a:off x="2269919" y="1140235"/>
+            <a:ext cx="879238" cy="468002"/>
+          </a:xfrm>
+          <a:prstGeom prst="rect">
+            <a:avLst/>
+          </a:prstGeom>
+          <a:solidFill>
+            <a:schemeClr val="accent5">
+              <a:lumMod val="60000"/>
+              <a:lumOff val="40000"/>
+            </a:schemeClr>
+          </a:solidFill>
+        </p:spPr>
+        <p:style>
+          <a:lnRef idx="2">
+            <a:schemeClr val="accent1">
+              <a:shade val="15000"/>
+            </a:schemeClr>
+          </a:lnRef>
+          <a:fillRef idx="1">
+            <a:schemeClr val="accent1"/>
+          </a:fillRef>
+          <a:effectRef idx="0">
+            <a:schemeClr val="accent1"/>
+          </a:effectRef>
+          <a:fontRef idx="minor">
+            <a:schemeClr val="lt1"/>
+          </a:fontRef>
+        </p:style>
+        <p:txBody>
+          <a:bodyPr rtlCol="0" anchor="ctr"/>
+          <a:lstStyle/>
+          <a:p>
+            <a:pPr algn="ctr"/>
+            <a:r>
+              <a:rPr lang="it-IT" sz="1300" dirty="0">
+                <a:solidFill>
+                  <a:schemeClr val="tx1"/>
+                </a:solidFill>
+              </a:rPr>
+              <a:t>Time MLP</a:t>
+            </a:r>
+          </a:p>
+        </p:txBody>
+      </p:sp>
+      <p:sp>
+        <p:nvSpPr>
+          <p:cNvPr id="41" name="Rettangolo 40">
+            <a:extLst>
+              <a:ext uri="{FF2B5EF4-FFF2-40B4-BE49-F238E27FC236}">
+                <a16:creationId xmlns:a16="http://schemas.microsoft.com/office/drawing/2014/main" id="{3D320681-DF1A-6AC0-30B5-D70E7F5093AF}"/>
+              </a:ext>
+            </a:extLst>
+          </p:cNvPr>
+          <p:cNvSpPr/>
+          <p:nvPr/>
+        </p:nvSpPr>
+        <p:spPr>
+          <a:xfrm rot="5400000">
+            <a:off x="3356808" y="1203970"/>
+            <a:ext cx="488672" cy="306098"/>
+          </a:xfrm>
+          <a:prstGeom prst="rect">
+            <a:avLst/>
+          </a:prstGeom>
+          <a:solidFill>
+            <a:srgbClr val="FFFD78"/>
+          </a:solidFill>
+        </p:spPr>
+        <p:style>
+          <a:lnRef idx="2">
+            <a:schemeClr val="accent1">
+              <a:shade val="15000"/>
+            </a:schemeClr>
+          </a:lnRef>
+          <a:fillRef idx="1">
+            <a:schemeClr val="accent1"/>
+          </a:fillRef>
+          <a:effectRef idx="0">
+            <a:schemeClr val="accent1"/>
+          </a:effectRef>
+          <a:fontRef idx="minor">
+            <a:schemeClr val="lt1"/>
+          </a:fontRef>
+        </p:style>
+        <p:txBody>
+          <a:bodyPr rtlCol="0" anchor="ctr"/>
+          <a:lstStyle/>
+          <a:p>
+            <a:pPr algn="ctr"/>
+            <a:r>
+              <a:rPr lang="it-IT" sz="1100" b="1" dirty="0" err="1">
+                <a:solidFill>
+                  <a:schemeClr val="tx1"/>
+                </a:solidFill>
+              </a:rPr>
+              <a:t>Relu</a:t>
+            </a:r>
+            <a:endParaRPr lang="it-IT" sz="1100" b="1" dirty="0">
+              <a:solidFill>
+                <a:schemeClr val="tx1"/>
+              </a:solidFill>
+            </a:endParaRPr>
+          </a:p>
+        </p:txBody>
+      </p:sp>
+      <p:cxnSp>
+        <p:nvCxnSpPr>
+          <p:cNvPr id="42" name="Connettore 2 41">
+            <a:extLst>
+              <a:ext uri="{FF2B5EF4-FFF2-40B4-BE49-F238E27FC236}">
+                <a16:creationId xmlns:a16="http://schemas.microsoft.com/office/drawing/2014/main" id="{F7AC9600-8005-3601-EA1B-2B8C6E9A4A7F}"/>
+              </a:ext>
+            </a:extLst>
+          </p:cNvPr>
+          <p:cNvCxnSpPr>
+            <a:cxnSpLocks/>
+            <a:endCxn id="40" idx="1"/>
+          </p:cNvCxnSpPr>
+          <p:nvPr/>
+        </p:nvCxnSpPr>
+        <p:spPr>
+          <a:xfrm>
+            <a:off x="1523839" y="968570"/>
+            <a:ext cx="746080" cy="405666"/>
+          </a:xfrm>
+          <a:prstGeom prst="straightConnector1">
+            <a:avLst/>
+          </a:prstGeom>
+          <a:ln w="25400" cmpd="sng">
+            <a:tailEnd type="triangle"/>
+          </a:ln>
+        </p:spPr>
+        <p:style>
+          <a:lnRef idx="2">
+            <a:schemeClr val="dk1"/>
+          </a:lnRef>
+          <a:fillRef idx="0">
+            <a:schemeClr val="dk1"/>
+          </a:fillRef>
+          <a:effectRef idx="1">
+            <a:schemeClr val="dk1"/>
+          </a:effectRef>
+          <a:fontRef idx="minor">
+            <a:schemeClr val="tx1"/>
+          </a:fontRef>
+        </p:style>
+      </p:cxnSp>
+      <p:cxnSp>
+        <p:nvCxnSpPr>
+          <p:cNvPr id="43" name="Connettore 2 42">
+            <a:extLst>
+              <a:ext uri="{FF2B5EF4-FFF2-40B4-BE49-F238E27FC236}">
+                <a16:creationId xmlns:a16="http://schemas.microsoft.com/office/drawing/2014/main" id="{694ECCB4-8599-5752-7CE2-7EEB528F122A}"/>
+              </a:ext>
+            </a:extLst>
+          </p:cNvPr>
+          <p:cNvCxnSpPr>
+            <a:cxnSpLocks/>
+            <a:endCxn id="41" idx="2"/>
+          </p:cNvCxnSpPr>
+          <p:nvPr/>
+        </p:nvCxnSpPr>
+        <p:spPr>
+          <a:xfrm flipV="1">
+            <a:off x="3149157" y="1357019"/>
+            <a:ext cx="298938" cy="7359"/>
+          </a:xfrm>
+          <a:prstGeom prst="straightConnector1">
+            <a:avLst/>
+          </a:prstGeom>
+          <a:ln w="25400" cmpd="sng">
+            <a:tailEnd type="triangle"/>
+          </a:ln>
+        </p:spPr>
+        <p:style>
+          <a:lnRef idx="2">
+            <a:schemeClr val="dk1"/>
+          </a:lnRef>
+          <a:fillRef idx="0">
+            <a:schemeClr val="dk1"/>
+          </a:fillRef>
+          <a:effectRef idx="1">
+            <a:schemeClr val="dk1"/>
+          </a:effectRef>
+          <a:fontRef idx="minor">
+            <a:schemeClr val="tx1"/>
+          </a:fontRef>
+        </p:style>
+      </p:cxnSp>
+      <p:cxnSp>
+        <p:nvCxnSpPr>
+          <p:cNvPr id="44" name="Connettore 2 43">
+            <a:extLst>
+              <a:ext uri="{FF2B5EF4-FFF2-40B4-BE49-F238E27FC236}">
+                <a16:creationId xmlns:a16="http://schemas.microsoft.com/office/drawing/2014/main" id="{DB1ABA58-D41F-25FD-826C-D10A44CA4B45}"/>
+              </a:ext>
+            </a:extLst>
+          </p:cNvPr>
+          <p:cNvCxnSpPr>
+            <a:cxnSpLocks/>
+            <a:stCxn id="41" idx="3"/>
+            <a:endCxn id="62" idx="0"/>
+          </p:cNvCxnSpPr>
+          <p:nvPr/>
+        </p:nvCxnSpPr>
+        <p:spPr>
+          <a:xfrm flipH="1">
+            <a:off x="3010788" y="1601355"/>
+            <a:ext cx="590356" cy="1012288"/>
+          </a:xfrm>
+          <a:prstGeom prst="straightConnector1">
+            <a:avLst/>
+          </a:prstGeom>
+          <a:ln w="25400" cmpd="sng">
+            <a:tailEnd type="triangle"/>
+          </a:ln>
+        </p:spPr>
+        <p:style>
+          <a:lnRef idx="2">
+            <a:schemeClr val="dk1"/>
+          </a:lnRef>
+          <a:fillRef idx="0">
+            <a:schemeClr val="dk1"/>
+          </a:fillRef>
+          <a:effectRef idx="1">
+            <a:schemeClr val="dk1"/>
+          </a:effectRef>
+          <a:fontRef idx="minor">
+            <a:schemeClr val="tx1"/>
+          </a:fontRef>
+        </p:style>
+      </p:cxnSp>
+      <p:cxnSp>
+        <p:nvCxnSpPr>
+          <p:cNvPr id="46" name="Connettore 2 45">
+            <a:extLst>
+              <a:ext uri="{FF2B5EF4-FFF2-40B4-BE49-F238E27FC236}">
+                <a16:creationId xmlns:a16="http://schemas.microsoft.com/office/drawing/2014/main" id="{5847CD3E-CED8-0212-3A79-46506FB7A116}"/>
+              </a:ext>
+            </a:extLst>
+          </p:cNvPr>
+          <p:cNvCxnSpPr>
+            <a:cxnSpLocks/>
+            <a:stCxn id="32" idx="3"/>
+            <a:endCxn id="62" idx="3"/>
+          </p:cNvCxnSpPr>
+          <p:nvPr/>
+        </p:nvCxnSpPr>
+        <p:spPr>
+          <a:xfrm flipV="1">
+            <a:off x="2611515" y="2774843"/>
+            <a:ext cx="335302" cy="299908"/>
+          </a:xfrm>
+          <a:prstGeom prst="straightConnector1">
+            <a:avLst/>
+          </a:prstGeom>
+          <a:ln w="25400" cmpd="sng">
+            <a:tailEnd type="triangle"/>
+          </a:ln>
+        </p:spPr>
+        <p:style>
+          <a:lnRef idx="2">
+            <a:schemeClr val="dk1"/>
+          </a:lnRef>
+          <a:fillRef idx="0">
+            <a:schemeClr val="dk1"/>
+          </a:fillRef>
+          <a:effectRef idx="1">
+            <a:schemeClr val="dk1"/>
+          </a:effectRef>
+          <a:fontRef idx="minor">
+            <a:schemeClr val="tx1"/>
+          </a:fontRef>
+        </p:style>
+      </p:cxnSp>
+      <p:cxnSp>
+        <p:nvCxnSpPr>
+          <p:cNvPr id="47" name="Connettore 2 46">
+            <a:extLst>
+              <a:ext uri="{FF2B5EF4-FFF2-40B4-BE49-F238E27FC236}">
+                <a16:creationId xmlns:a16="http://schemas.microsoft.com/office/drawing/2014/main" id="{4CB93277-A13F-8FEA-F021-164DCEF2C3FF}"/>
+              </a:ext>
+            </a:extLst>
+          </p:cNvPr>
+          <p:cNvCxnSpPr>
+            <a:cxnSpLocks/>
+            <a:stCxn id="62" idx="6"/>
+          </p:cNvCxnSpPr>
+          <p:nvPr/>
+        </p:nvCxnSpPr>
+        <p:spPr>
+          <a:xfrm>
+            <a:off x="3101256" y="2708072"/>
+            <a:ext cx="328771" cy="329024"/>
+          </a:xfrm>
+          <a:prstGeom prst="straightConnector1">
+            <a:avLst/>
+          </a:prstGeom>
+          <a:ln w="25400" cmpd="sng">
+            <a:tailEnd type="triangle"/>
+          </a:ln>
+        </p:spPr>
+        <p:style>
+          <a:lnRef idx="2">
+            <a:schemeClr val="dk1"/>
+          </a:lnRef>
+          <a:fillRef idx="0">
+            <a:schemeClr val="dk1"/>
+          </a:fillRef>
+          <a:effectRef idx="1">
+            <a:schemeClr val="dk1"/>
+          </a:effectRef>
+          <a:fontRef idx="minor">
+            <a:schemeClr val="tx1"/>
+          </a:fontRef>
+        </p:style>
+      </p:cxnSp>
+      <p:sp>
+        <p:nvSpPr>
+          <p:cNvPr id="48" name="Rettangolo 47">
+            <a:extLst>
+              <a:ext uri="{FF2B5EF4-FFF2-40B4-BE49-F238E27FC236}">
+                <a16:creationId xmlns:a16="http://schemas.microsoft.com/office/drawing/2014/main" id="{6341230F-C8B3-5562-EB07-38B128E58C1A}"/>
+              </a:ext>
+            </a:extLst>
+          </p:cNvPr>
+          <p:cNvSpPr/>
+          <p:nvPr/>
+        </p:nvSpPr>
+        <p:spPr>
+          <a:xfrm rot="5400000">
+            <a:off x="3848616" y="2900450"/>
+            <a:ext cx="1787520" cy="306098"/>
+          </a:xfrm>
+          <a:prstGeom prst="rect">
+            <a:avLst/>
+          </a:prstGeom>
+          <a:solidFill>
+            <a:schemeClr val="accent2"/>
+          </a:solidFill>
+        </p:spPr>
+        <p:style>
+          <a:lnRef idx="2">
+            <a:schemeClr val="accent1">
+              <a:shade val="15000"/>
+            </a:schemeClr>
+          </a:lnRef>
+          <a:fillRef idx="1">
+            <a:schemeClr val="accent1"/>
+          </a:fillRef>
+          <a:effectRef idx="0">
+            <a:schemeClr val="accent1"/>
+          </a:effectRef>
+          <a:fontRef idx="minor">
+            <a:schemeClr val="lt1"/>
+          </a:fontRef>
+        </p:style>
+        <p:txBody>
+          <a:bodyPr rtlCol="0" anchor="ctr"/>
+          <a:lstStyle/>
+          <a:p>
+            <a:pPr algn="ctr"/>
+            <a:r>
+              <a:rPr lang="it-IT" sz="2000" b="1" dirty="0" err="1">
+                <a:solidFill>
+                  <a:schemeClr val="tx1"/>
+                </a:solidFill>
+              </a:rPr>
+              <a:t>Downsample</a:t>
+            </a:r>
+            <a:endParaRPr lang="it-IT" sz="2000" b="1" dirty="0">
+              <a:solidFill>
+                <a:schemeClr val="tx1"/>
+              </a:solidFill>
+            </a:endParaRPr>
+          </a:p>
+        </p:txBody>
+      </p:sp>
+      <p:sp>
+        <p:nvSpPr>
+          <p:cNvPr id="53" name="CasellaDiTesto 52">
+            <a:extLst>
+              <a:ext uri="{FF2B5EF4-FFF2-40B4-BE49-F238E27FC236}">
+                <a16:creationId xmlns:a16="http://schemas.microsoft.com/office/drawing/2014/main" id="{69F5DB39-AC34-CFF1-1008-5E3B453E28BD}"/>
+              </a:ext>
+            </a:extLst>
+          </p:cNvPr>
+          <p:cNvSpPr txBox="1"/>
+          <p:nvPr/>
+        </p:nvSpPr>
+        <p:spPr>
+          <a:xfrm>
+            <a:off x="2602303" y="4016938"/>
+            <a:ext cx="1505044" cy="430887"/>
+          </a:xfrm>
+          <a:prstGeom prst="rect">
+            <a:avLst/>
+          </a:prstGeom>
+          <a:noFill/>
+        </p:spPr>
+        <p:txBody>
+          <a:bodyPr wrap="square" rtlCol="0">
+            <a:spAutoFit/>
+          </a:bodyPr>
+          <a:lstStyle/>
+          <a:p>
+            <a:r>
+              <a:rPr lang="it-IT" sz="2200" dirty="0"/>
+              <a:t>ENCODER</a:t>
+            </a:r>
+          </a:p>
+        </p:txBody>
+      </p:sp>
+      <p:sp>
+        <p:nvSpPr>
+          <p:cNvPr id="54" name="Rettangolo 53">
+            <a:extLst>
+              <a:ext uri="{FF2B5EF4-FFF2-40B4-BE49-F238E27FC236}">
+                <a16:creationId xmlns:a16="http://schemas.microsoft.com/office/drawing/2014/main" id="{7250BDC4-CE68-FA76-D2F6-4724880B7BA8}"/>
+              </a:ext>
+            </a:extLst>
+          </p:cNvPr>
+          <p:cNvSpPr/>
+          <p:nvPr/>
+        </p:nvSpPr>
+        <p:spPr>
+          <a:xfrm>
+            <a:off x="3440185" y="2152878"/>
+            <a:ext cx="792575" cy="1828537"/>
+          </a:xfrm>
+          <a:prstGeom prst="rect">
+            <a:avLst/>
+          </a:prstGeom>
+          <a:solidFill>
+            <a:schemeClr val="accent2">
+              <a:lumMod val="60000"/>
+              <a:lumOff val="40000"/>
+            </a:schemeClr>
+          </a:solidFill>
+        </p:spPr>
+        <p:style>
+          <a:lnRef idx="2">
+            <a:schemeClr val="accent1">
+              <a:shade val="15000"/>
+            </a:schemeClr>
+          </a:lnRef>
+          <a:fillRef idx="1">
+            <a:schemeClr val="accent1"/>
+          </a:fillRef>
+          <a:effectRef idx="0">
+            <a:schemeClr val="accent1"/>
+          </a:effectRef>
+          <a:fontRef idx="minor">
+            <a:schemeClr val="lt1"/>
+          </a:fontRef>
+        </p:style>
+        <p:txBody>
+          <a:bodyPr rtlCol="0" anchor="ctr"/>
+          <a:lstStyle/>
+          <a:p>
+            <a:pPr algn="ctr"/>
+            <a:endParaRPr lang="it-IT"/>
+          </a:p>
+        </p:txBody>
+      </p:sp>
+      <p:sp>
+        <p:nvSpPr>
+          <p:cNvPr id="55" name="Rettangolo 54">
+            <a:extLst>
+              <a:ext uri="{FF2B5EF4-FFF2-40B4-BE49-F238E27FC236}">
+                <a16:creationId xmlns:a16="http://schemas.microsoft.com/office/drawing/2014/main" id="{B90BBAA3-838B-3055-5C2A-660A4CA0843B}"/>
+              </a:ext>
+            </a:extLst>
+          </p:cNvPr>
+          <p:cNvSpPr/>
+          <p:nvPr/>
+        </p:nvSpPr>
+        <p:spPr>
+          <a:xfrm rot="5400000">
+            <a:off x="3226726" y="2366336"/>
+            <a:ext cx="733013" cy="306098"/>
+          </a:xfrm>
+          <a:prstGeom prst="rect">
+            <a:avLst/>
+          </a:prstGeom>
+          <a:solidFill>
+            <a:schemeClr val="accent2"/>
+          </a:solidFill>
+        </p:spPr>
+        <p:style>
+          <a:lnRef idx="2">
+            <a:schemeClr val="accent1">
+              <a:shade val="15000"/>
+            </a:schemeClr>
+          </a:lnRef>
+          <a:fillRef idx="1">
+            <a:schemeClr val="accent1"/>
+          </a:fillRef>
+          <a:effectRef idx="0">
+            <a:schemeClr val="accent1"/>
+          </a:effectRef>
+          <a:fontRef idx="minor">
+            <a:schemeClr val="lt1"/>
+          </a:fontRef>
+        </p:style>
+        <p:txBody>
+          <a:bodyPr rtlCol="0" anchor="ctr"/>
+          <a:lstStyle/>
+          <a:p>
+            <a:pPr algn="ctr"/>
+            <a:r>
+              <a:rPr lang="it-IT" sz="1100" b="1" dirty="0">
+                <a:solidFill>
+                  <a:schemeClr val="tx1"/>
+                </a:solidFill>
+              </a:rPr>
+              <a:t>Conv2D</a:t>
+            </a:r>
+          </a:p>
+        </p:txBody>
+      </p:sp>
+      <p:sp>
+        <p:nvSpPr>
+          <p:cNvPr id="57" name="Rettangolo 56">
+            <a:extLst>
+              <a:ext uri="{FF2B5EF4-FFF2-40B4-BE49-F238E27FC236}">
+                <a16:creationId xmlns:a16="http://schemas.microsoft.com/office/drawing/2014/main" id="{1CE281C2-BCD6-9E02-3359-4B617C2A6A29}"/>
+              </a:ext>
+            </a:extLst>
+          </p:cNvPr>
+          <p:cNvSpPr/>
+          <p:nvPr/>
+        </p:nvSpPr>
+        <p:spPr>
+          <a:xfrm rot="5400000">
+            <a:off x="3489435" y="2979187"/>
+            <a:ext cx="733015" cy="393394"/>
+          </a:xfrm>
+          <a:prstGeom prst="rect">
+            <a:avLst/>
+          </a:prstGeom>
+          <a:solidFill>
+            <a:srgbClr val="0096FF"/>
+          </a:solidFill>
+        </p:spPr>
+        <p:style>
+          <a:lnRef idx="2">
+            <a:schemeClr val="accent1">
+              <a:shade val="15000"/>
+            </a:schemeClr>
+          </a:lnRef>
+          <a:fillRef idx="1">
+            <a:schemeClr val="accent1"/>
+          </a:fillRef>
+          <a:effectRef idx="0">
+            <a:schemeClr val="accent1"/>
+          </a:effectRef>
+          <a:fontRef idx="minor">
+            <a:schemeClr val="lt1"/>
+          </a:fontRef>
+        </p:style>
+        <p:txBody>
+          <a:bodyPr rtlCol="0" anchor="ctr"/>
+          <a:lstStyle/>
+          <a:p>
+            <a:pPr algn="ctr"/>
+            <a:r>
+              <a:rPr lang="it-IT" sz="1300" b="1" dirty="0">
+                <a:solidFill>
+                  <a:schemeClr val="tx1"/>
+                </a:solidFill>
+              </a:rPr>
+              <a:t>Batch </a:t>
+            </a:r>
+            <a:r>
+              <a:rPr lang="it-IT" sz="1300" b="1" dirty="0" err="1">
+                <a:solidFill>
+                  <a:schemeClr val="tx1"/>
+                </a:solidFill>
+              </a:rPr>
+              <a:t>Nrom</a:t>
+            </a:r>
+            <a:endParaRPr lang="it-IT" sz="1300" b="1" dirty="0">
+              <a:solidFill>
+                <a:schemeClr val="tx1"/>
+              </a:solidFill>
+            </a:endParaRPr>
+          </a:p>
+        </p:txBody>
+      </p:sp>
+      <p:sp>
+        <p:nvSpPr>
+          <p:cNvPr id="58" name="Rettangolo 57">
+            <a:extLst>
+              <a:ext uri="{FF2B5EF4-FFF2-40B4-BE49-F238E27FC236}">
+                <a16:creationId xmlns:a16="http://schemas.microsoft.com/office/drawing/2014/main" id="{E7A3E086-12F5-E2B5-9753-D66F2B7A8028}"/>
+              </a:ext>
+            </a:extLst>
+          </p:cNvPr>
+          <p:cNvSpPr/>
+          <p:nvPr/>
+        </p:nvSpPr>
+        <p:spPr>
+          <a:xfrm rot="5400000">
+            <a:off x="3835375" y="3577170"/>
+            <a:ext cx="488672" cy="306098"/>
+          </a:xfrm>
+          <a:prstGeom prst="rect">
+            <a:avLst/>
+          </a:prstGeom>
+          <a:solidFill>
+            <a:srgbClr val="FFFD78"/>
+          </a:solidFill>
+        </p:spPr>
+        <p:style>
+          <a:lnRef idx="2">
+            <a:schemeClr val="accent1">
+              <a:shade val="15000"/>
+            </a:schemeClr>
+          </a:lnRef>
+          <a:fillRef idx="1">
+            <a:schemeClr val="accent1"/>
+          </a:fillRef>
+          <a:effectRef idx="0">
+            <a:schemeClr val="accent1"/>
+          </a:effectRef>
+          <a:fontRef idx="minor">
+            <a:schemeClr val="lt1"/>
+          </a:fontRef>
+        </p:style>
+        <p:txBody>
+          <a:bodyPr rtlCol="0" anchor="ctr"/>
+          <a:lstStyle/>
+          <a:p>
+            <a:pPr algn="ctr"/>
+            <a:r>
+              <a:rPr lang="it-IT" sz="1100" b="1" dirty="0" err="1">
+                <a:solidFill>
+                  <a:schemeClr val="tx1"/>
+                </a:solidFill>
+              </a:rPr>
+              <a:t>Relu</a:t>
+            </a:r>
+            <a:endParaRPr lang="it-IT" sz="1100" b="1" dirty="0">
+              <a:solidFill>
+                <a:schemeClr val="tx1"/>
+              </a:solidFill>
+            </a:endParaRPr>
+          </a:p>
+        </p:txBody>
+      </p:sp>
+      <p:cxnSp>
+        <p:nvCxnSpPr>
+          <p:cNvPr id="59" name="Connettore 2 58">
+            <a:extLst>
+              <a:ext uri="{FF2B5EF4-FFF2-40B4-BE49-F238E27FC236}">
+                <a16:creationId xmlns:a16="http://schemas.microsoft.com/office/drawing/2014/main" id="{1E6A5631-3E87-D38C-3D07-8B25FE6DB594}"/>
+              </a:ext>
+            </a:extLst>
+          </p:cNvPr>
+          <p:cNvCxnSpPr>
+            <a:cxnSpLocks/>
+            <a:stCxn id="54" idx="3"/>
+            <a:endCxn id="48" idx="2"/>
+          </p:cNvCxnSpPr>
+          <p:nvPr/>
+        </p:nvCxnSpPr>
+        <p:spPr>
+          <a:xfrm flipV="1">
+            <a:off x="4232760" y="3053499"/>
+            <a:ext cx="356567" cy="13648"/>
+          </a:xfrm>
+          <a:prstGeom prst="straightConnector1">
+            <a:avLst/>
+          </a:prstGeom>
+          <a:ln w="25400" cmpd="sng">
+            <a:tailEnd type="triangle"/>
+          </a:ln>
+        </p:spPr>
+        <p:style>
+          <a:lnRef idx="2">
+            <a:schemeClr val="dk1"/>
+          </a:lnRef>
+          <a:fillRef idx="0">
+            <a:schemeClr val="dk1"/>
+          </a:fillRef>
+          <a:effectRef idx="1">
+            <a:schemeClr val="dk1"/>
+          </a:effectRef>
+          <a:fontRef idx="minor">
+            <a:schemeClr val="tx1"/>
+          </a:fontRef>
+        </p:style>
+      </p:cxnSp>
+      <p:sp>
+        <p:nvSpPr>
+          <p:cNvPr id="62" name="OR 61">
+            <a:extLst>
+              <a:ext uri="{FF2B5EF4-FFF2-40B4-BE49-F238E27FC236}">
+                <a16:creationId xmlns:a16="http://schemas.microsoft.com/office/drawing/2014/main" id="{90B03B8D-373F-C43C-30D9-DE180108DC5F}"/>
+              </a:ext>
+            </a:extLst>
+          </p:cNvPr>
+          <p:cNvSpPr/>
+          <p:nvPr/>
+        </p:nvSpPr>
+        <p:spPr>
+          <a:xfrm>
+            <a:off x="2920320" y="2613643"/>
+            <a:ext cx="180936" cy="188858"/>
+          </a:xfrm>
+          <a:prstGeom prst="flowChartOr">
+            <a:avLst/>
+          </a:prstGeom>
+          <a:ln/>
+        </p:spPr>
+        <p:style>
+          <a:lnRef idx="2">
+            <a:schemeClr val="dk1"/>
+          </a:lnRef>
+          <a:fillRef idx="1">
+            <a:schemeClr val="lt1"/>
+          </a:fillRef>
+          <a:effectRef idx="0">
+            <a:schemeClr val="dk1"/>
+          </a:effectRef>
+          <a:fontRef idx="minor">
+            <a:schemeClr val="dk1"/>
+          </a:fontRef>
+        </p:style>
+        <p:txBody>
+          <a:bodyPr rtlCol="0" anchor="ctr"/>
+          <a:lstStyle/>
+          <a:p>
+            <a:pPr algn="ctr"/>
+            <a:endParaRPr lang="it-IT"/>
+          </a:p>
+        </p:txBody>
+      </p:sp>
+      <p:cxnSp>
+        <p:nvCxnSpPr>
+          <p:cNvPr id="65" name="Connettore 4 64">
+            <a:extLst>
+              <a:ext uri="{FF2B5EF4-FFF2-40B4-BE49-F238E27FC236}">
+                <a16:creationId xmlns:a16="http://schemas.microsoft.com/office/drawing/2014/main" id="{19B8A329-6C95-9BAE-A2A8-9FA99661622A}"/>
+              </a:ext>
+            </a:extLst>
+          </p:cNvPr>
+          <p:cNvCxnSpPr>
+            <a:cxnSpLocks/>
+          </p:cNvCxnSpPr>
+          <p:nvPr/>
+        </p:nvCxnSpPr>
+        <p:spPr>
+          <a:xfrm rot="16200000" flipH="1">
+            <a:off x="3087115" y="4716254"/>
+            <a:ext cx="1967616" cy="1430756"/>
+          </a:xfrm>
+          <a:prstGeom prst="bentConnector2">
+            <a:avLst/>
+          </a:prstGeom>
+          <a:ln>
+            <a:tailEnd type="triangle"/>
+          </a:ln>
+        </p:spPr>
+        <p:style>
+          <a:lnRef idx="3">
+            <a:schemeClr val="dk1"/>
+          </a:lnRef>
+          <a:fillRef idx="0">
+            <a:schemeClr val="dk1"/>
+          </a:fillRef>
+          <a:effectRef idx="2">
+            <a:schemeClr val="dk1"/>
+          </a:effectRef>
+          <a:fontRef idx="minor">
+            <a:schemeClr val="tx1"/>
+          </a:fontRef>
+        </p:style>
+      </p:cxnSp>
+      <p:pic>
+        <p:nvPicPr>
+          <p:cNvPr id="66" name="Immagine 65">
+            <a:extLst>
+              <a:ext uri="{FF2B5EF4-FFF2-40B4-BE49-F238E27FC236}">
+                <a16:creationId xmlns:a16="http://schemas.microsoft.com/office/drawing/2014/main" id="{D359820B-5970-ACC9-D4D9-24393F7DC556}"/>
+              </a:ext>
+            </a:extLst>
+          </p:cNvPr>
+          <p:cNvPicPr>
+            <a:picLocks noChangeAspect="1"/>
+          </p:cNvPicPr>
+          <p:nvPr/>
+        </p:nvPicPr>
+        <p:blipFill>
+          <a:blip r:embed="rId3"/>
+          <a:stretch>
+            <a:fillRect/>
+          </a:stretch>
+        </p:blipFill>
+        <p:spPr>
+          <a:xfrm>
+            <a:off x="18804" y="1510599"/>
+            <a:ext cx="584200" cy="596900"/>
+          </a:xfrm>
+          <a:prstGeom prst="rect">
+            <a:avLst/>
+          </a:prstGeom>
+        </p:spPr>
+      </p:pic>
+      <p:sp>
+        <p:nvSpPr>
+          <p:cNvPr id="67" name="Rettangolo 66">
+            <a:extLst>
+              <a:ext uri="{FF2B5EF4-FFF2-40B4-BE49-F238E27FC236}">
+                <a16:creationId xmlns:a16="http://schemas.microsoft.com/office/drawing/2014/main" id="{1F01C0E8-57DD-BB4F-8117-4E135810AD19}"/>
+              </a:ext>
+            </a:extLst>
+          </p:cNvPr>
+          <p:cNvSpPr/>
+          <p:nvPr/>
+        </p:nvSpPr>
+        <p:spPr>
+          <a:xfrm>
+            <a:off x="959070" y="1468712"/>
+            <a:ext cx="879238" cy="468002"/>
+          </a:xfrm>
+          <a:prstGeom prst="rect">
+            <a:avLst/>
+          </a:prstGeom>
+          <a:solidFill>
+            <a:schemeClr val="accent5">
+              <a:lumMod val="60000"/>
+              <a:lumOff val="40000"/>
+            </a:schemeClr>
+          </a:solidFill>
+        </p:spPr>
+        <p:style>
+          <a:lnRef idx="2">
+            <a:schemeClr val="accent1">
+              <a:shade val="15000"/>
+            </a:schemeClr>
+          </a:lnRef>
+          <a:fillRef idx="1">
+            <a:schemeClr val="accent1"/>
+          </a:fillRef>
+          <a:effectRef idx="0">
+            <a:schemeClr val="accent1"/>
+          </a:effectRef>
+          <a:fontRef idx="minor">
+            <a:schemeClr val="lt1"/>
+          </a:fontRef>
+        </p:style>
+        <p:txBody>
+          <a:bodyPr rtlCol="0" anchor="ctr"/>
+          <a:lstStyle/>
+          <a:p>
+            <a:pPr algn="ctr"/>
+            <a:r>
+              <a:rPr lang="it-IT" sz="1300" dirty="0">
+                <a:solidFill>
+                  <a:schemeClr val="tx1"/>
+                </a:solidFill>
+              </a:rPr>
+              <a:t>LR</a:t>
+            </a:r>
+          </a:p>
+          <a:p>
+            <a:pPr algn="ctr"/>
+            <a:r>
+              <a:rPr lang="it-IT" sz="1300" dirty="0">
+                <a:solidFill>
+                  <a:schemeClr val="tx1"/>
+                </a:solidFill>
+              </a:rPr>
+              <a:t>Encoding</a:t>
+            </a:r>
+          </a:p>
+        </p:txBody>
+      </p:sp>
+      <p:cxnSp>
+        <p:nvCxnSpPr>
+          <p:cNvPr id="68" name="Connettore 2 67">
+            <a:extLst>
+              <a:ext uri="{FF2B5EF4-FFF2-40B4-BE49-F238E27FC236}">
+                <a16:creationId xmlns:a16="http://schemas.microsoft.com/office/drawing/2014/main" id="{40EEB9E2-0C73-8D15-BF48-507D04EC671B}"/>
+              </a:ext>
+            </a:extLst>
+          </p:cNvPr>
+          <p:cNvCxnSpPr>
+            <a:cxnSpLocks/>
+            <a:endCxn id="67" idx="1"/>
+          </p:cNvCxnSpPr>
+          <p:nvPr/>
+        </p:nvCxnSpPr>
+        <p:spPr>
+          <a:xfrm flipV="1">
+            <a:off x="603004" y="1702713"/>
+            <a:ext cx="356066" cy="118029"/>
+          </a:xfrm>
+          <a:prstGeom prst="straightConnector1">
+            <a:avLst/>
+          </a:prstGeom>
+          <a:ln w="25400" cmpd="sng">
+            <a:tailEnd type="triangle"/>
+          </a:ln>
+        </p:spPr>
+        <p:style>
+          <a:lnRef idx="2">
+            <a:schemeClr val="dk1"/>
+          </a:lnRef>
+          <a:fillRef idx="0">
+            <a:schemeClr val="dk1"/>
+          </a:fillRef>
+          <a:effectRef idx="1">
+            <a:schemeClr val="dk1"/>
+          </a:effectRef>
+          <a:fontRef idx="minor">
+            <a:schemeClr val="tx1"/>
+          </a:fontRef>
+        </p:style>
+      </p:cxnSp>
+      <p:cxnSp>
+        <p:nvCxnSpPr>
+          <p:cNvPr id="70" name="Connettore 2 69">
+            <a:extLst>
+              <a:ext uri="{FF2B5EF4-FFF2-40B4-BE49-F238E27FC236}">
+                <a16:creationId xmlns:a16="http://schemas.microsoft.com/office/drawing/2014/main" id="{884D47E2-FFDB-824F-09E8-0DD4F195B710}"/>
+              </a:ext>
+            </a:extLst>
+          </p:cNvPr>
+          <p:cNvCxnSpPr>
+            <a:cxnSpLocks/>
+            <a:stCxn id="30" idx="0"/>
+            <a:endCxn id="29" idx="1"/>
+          </p:cNvCxnSpPr>
+          <p:nvPr/>
+        </p:nvCxnSpPr>
+        <p:spPr>
+          <a:xfrm flipV="1">
+            <a:off x="1323256" y="3258285"/>
+            <a:ext cx="382868" cy="3435"/>
+          </a:xfrm>
+          <a:prstGeom prst="straightConnector1">
+            <a:avLst/>
+          </a:prstGeom>
+          <a:ln w="25400" cmpd="sng">
+            <a:tailEnd type="triangle"/>
+          </a:ln>
+        </p:spPr>
+        <p:style>
+          <a:lnRef idx="2">
+            <a:schemeClr val="dk1"/>
+          </a:lnRef>
+          <a:fillRef idx="0">
+            <a:schemeClr val="dk1"/>
+          </a:fillRef>
+          <a:effectRef idx="1">
+            <a:schemeClr val="dk1"/>
+          </a:effectRef>
+          <a:fontRef idx="minor">
+            <a:schemeClr val="tx1"/>
+          </a:fontRef>
+        </p:style>
+      </p:cxnSp>
+      <p:cxnSp>
+        <p:nvCxnSpPr>
+          <p:cNvPr id="71" name="Connettore 2 70">
+            <a:extLst>
+              <a:ext uri="{FF2B5EF4-FFF2-40B4-BE49-F238E27FC236}">
+                <a16:creationId xmlns:a16="http://schemas.microsoft.com/office/drawing/2014/main" id="{909A76F9-C34B-00BE-DB85-76E2C8E54859}"/>
+              </a:ext>
+            </a:extLst>
+          </p:cNvPr>
+          <p:cNvCxnSpPr>
+            <a:cxnSpLocks/>
+            <a:stCxn id="67" idx="2"/>
+            <a:endCxn id="74" idx="0"/>
+          </p:cNvCxnSpPr>
+          <p:nvPr/>
+        </p:nvCxnSpPr>
+        <p:spPr>
+          <a:xfrm flipH="1">
+            <a:off x="1032986" y="1936714"/>
+            <a:ext cx="365703" cy="263741"/>
+          </a:xfrm>
+          <a:prstGeom prst="straightConnector1">
+            <a:avLst/>
+          </a:prstGeom>
+          <a:ln w="25400" cmpd="sng">
+            <a:tailEnd type="triangle"/>
+          </a:ln>
+        </p:spPr>
+        <p:style>
+          <a:lnRef idx="2">
+            <a:schemeClr val="dk1"/>
+          </a:lnRef>
+          <a:fillRef idx="0">
+            <a:schemeClr val="dk1"/>
+          </a:fillRef>
+          <a:effectRef idx="1">
+            <a:schemeClr val="dk1"/>
+          </a:effectRef>
+          <a:fontRef idx="minor">
+            <a:schemeClr val="tx1"/>
+          </a:fontRef>
+        </p:style>
+      </p:cxnSp>
+      <p:cxnSp>
+        <p:nvCxnSpPr>
+          <p:cNvPr id="72" name="Connettore 4 71">
+            <a:extLst>
+              <a:ext uri="{FF2B5EF4-FFF2-40B4-BE49-F238E27FC236}">
+                <a16:creationId xmlns:a16="http://schemas.microsoft.com/office/drawing/2014/main" id="{23520DB2-DFC5-8C5D-19A2-BFED272779CF}"/>
+              </a:ext>
+            </a:extLst>
+          </p:cNvPr>
+          <p:cNvCxnSpPr>
+            <a:cxnSpLocks/>
+            <a:stCxn id="30" idx="3"/>
+            <a:endCxn id="62" idx="4"/>
+          </p:cNvCxnSpPr>
+          <p:nvPr/>
+        </p:nvCxnSpPr>
+        <p:spPr>
+          <a:xfrm rot="5400000" flipH="1" flipV="1">
+            <a:off x="1475091" y="2497616"/>
+            <a:ext cx="1230811" cy="1840581"/>
+          </a:xfrm>
+          <a:prstGeom prst="bentConnector3">
+            <a:avLst>
+              <a:gd name="adj1" fmla="val -97092"/>
+            </a:avLst>
+          </a:prstGeom>
+          <a:ln>
+            <a:headEnd type="triangle"/>
+            <a:tailEnd type="triangle"/>
+          </a:ln>
+        </p:spPr>
+        <p:style>
+          <a:lnRef idx="2">
+            <a:schemeClr val="dk1"/>
+          </a:lnRef>
+          <a:fillRef idx="0">
+            <a:schemeClr val="dk1"/>
+          </a:fillRef>
+          <a:effectRef idx="1">
+            <a:schemeClr val="dk1"/>
+          </a:effectRef>
+          <a:fontRef idx="minor">
+            <a:schemeClr val="tx1"/>
+          </a:fontRef>
+        </p:style>
+      </p:cxnSp>
+      <p:pic>
+        <p:nvPicPr>
+          <p:cNvPr id="73" name="Immagine 72">
+            <a:extLst>
+              <a:ext uri="{FF2B5EF4-FFF2-40B4-BE49-F238E27FC236}">
+                <a16:creationId xmlns:a16="http://schemas.microsoft.com/office/drawing/2014/main" id="{E75DF447-548E-FC4E-867B-C090FF41D6CD}"/>
+              </a:ext>
+            </a:extLst>
+          </p:cNvPr>
+          <p:cNvPicPr>
+            <a:picLocks noChangeAspect="1"/>
+          </p:cNvPicPr>
+          <p:nvPr/>
+        </p:nvPicPr>
+        <p:blipFill>
+          <a:blip r:embed="rId4"/>
+          <a:stretch>
+            <a:fillRect/>
+          </a:stretch>
+        </p:blipFill>
+        <p:spPr>
+          <a:xfrm>
+            <a:off x="10386" y="2963269"/>
+            <a:ext cx="584200" cy="596900"/>
+          </a:xfrm>
+          <a:prstGeom prst="rect">
+            <a:avLst/>
+          </a:prstGeom>
+        </p:spPr>
+      </p:pic>
+      <p:sp>
+        <p:nvSpPr>
+          <p:cNvPr id="74" name="Rettangolo 73">
+            <a:extLst>
+              <a:ext uri="{FF2B5EF4-FFF2-40B4-BE49-F238E27FC236}">
+                <a16:creationId xmlns:a16="http://schemas.microsoft.com/office/drawing/2014/main" id="{F6A15F35-25C9-44B2-921D-0DD7A530CEFB}"/>
+              </a:ext>
+            </a:extLst>
+          </p:cNvPr>
+          <p:cNvSpPr/>
+          <p:nvPr/>
+        </p:nvSpPr>
+        <p:spPr>
+          <a:xfrm>
+            <a:off x="446432" y="2200455"/>
+            <a:ext cx="1173108" cy="155622"/>
+          </a:xfrm>
+          <a:prstGeom prst="rect">
+            <a:avLst/>
+          </a:prstGeom>
+          <a:solidFill>
+            <a:schemeClr val="accent5">
+              <a:lumMod val="60000"/>
+              <a:lumOff val="40000"/>
+            </a:schemeClr>
+          </a:solidFill>
+        </p:spPr>
+        <p:style>
+          <a:lnRef idx="2">
+            <a:schemeClr val="accent1">
+              <a:shade val="15000"/>
+            </a:schemeClr>
+          </a:lnRef>
+          <a:fillRef idx="1">
+            <a:schemeClr val="accent1"/>
+          </a:fillRef>
+          <a:effectRef idx="0">
+            <a:schemeClr val="accent1"/>
+          </a:effectRef>
+          <a:fontRef idx="minor">
+            <a:schemeClr val="lt1"/>
+          </a:fontRef>
+        </p:style>
+        <p:txBody>
+          <a:bodyPr rtlCol="0" anchor="ctr"/>
+          <a:lstStyle/>
+          <a:p>
+            <a:pPr algn="ctr"/>
+            <a:r>
+              <a:rPr lang="it-IT" sz="1300" dirty="0" err="1">
+                <a:solidFill>
+                  <a:schemeClr val="tx1"/>
+                </a:solidFill>
+              </a:rPr>
+              <a:t>Interpolation</a:t>
+            </a:r>
+            <a:endParaRPr lang="it-IT" sz="1300" dirty="0">
+              <a:solidFill>
+                <a:schemeClr val="tx1"/>
+              </a:solidFill>
+            </a:endParaRPr>
+          </a:p>
+        </p:txBody>
+      </p:sp>
+      <p:sp>
+        <p:nvSpPr>
+          <p:cNvPr id="127" name="Rettangolo 126">
+            <a:extLst>
+              <a:ext uri="{FF2B5EF4-FFF2-40B4-BE49-F238E27FC236}">
+                <a16:creationId xmlns:a16="http://schemas.microsoft.com/office/drawing/2014/main" id="{A9320E78-E7D1-8E78-DD9E-636A1C072548}"/>
+              </a:ext>
+            </a:extLst>
+          </p:cNvPr>
+          <p:cNvSpPr/>
+          <p:nvPr/>
+        </p:nvSpPr>
+        <p:spPr>
+          <a:xfrm>
+            <a:off x="4786301" y="6111027"/>
+            <a:ext cx="400497" cy="608826"/>
+          </a:xfrm>
+          <a:prstGeom prst="rect">
+            <a:avLst/>
+          </a:prstGeom>
+          <a:solidFill>
+            <a:schemeClr val="accent2">
+              <a:lumMod val="60000"/>
+              <a:lumOff val="40000"/>
+            </a:schemeClr>
+          </a:solidFill>
+        </p:spPr>
+        <p:style>
+          <a:lnRef idx="2">
+            <a:schemeClr val="accent1">
+              <a:shade val="15000"/>
+            </a:schemeClr>
+          </a:lnRef>
+          <a:fillRef idx="1">
+            <a:schemeClr val="accent1"/>
+          </a:fillRef>
+          <a:effectRef idx="0">
+            <a:schemeClr val="accent1"/>
+          </a:effectRef>
+          <a:fontRef idx="minor">
+            <a:schemeClr val="lt1"/>
+          </a:fontRef>
+        </p:style>
+        <p:txBody>
+          <a:bodyPr rtlCol="0" anchor="ctr"/>
+          <a:lstStyle/>
+          <a:p>
+            <a:pPr algn="ctr"/>
+            <a:endParaRPr lang="it-IT"/>
+          </a:p>
+        </p:txBody>
+      </p:sp>
+      <p:sp>
+        <p:nvSpPr>
+          <p:cNvPr id="128" name="Rettangolo 127">
+            <a:extLst>
+              <a:ext uri="{FF2B5EF4-FFF2-40B4-BE49-F238E27FC236}">
+                <a16:creationId xmlns:a16="http://schemas.microsoft.com/office/drawing/2014/main" id="{3CA4848E-66A6-7074-3E41-11D9C344D382}"/>
+              </a:ext>
+            </a:extLst>
+          </p:cNvPr>
+          <p:cNvSpPr/>
+          <p:nvPr/>
+        </p:nvSpPr>
+        <p:spPr>
+          <a:xfrm rot="5400000">
+            <a:off x="4729791" y="6167534"/>
+            <a:ext cx="271806" cy="158793"/>
+          </a:xfrm>
+          <a:prstGeom prst="rect">
+            <a:avLst/>
+          </a:prstGeom>
+          <a:solidFill>
+            <a:schemeClr val="accent2"/>
+          </a:solidFill>
+        </p:spPr>
+        <p:style>
+          <a:lnRef idx="2">
+            <a:schemeClr val="accent1">
+              <a:shade val="15000"/>
+            </a:schemeClr>
+          </a:lnRef>
+          <a:fillRef idx="1">
+            <a:schemeClr val="accent1"/>
+          </a:fillRef>
+          <a:effectRef idx="0">
+            <a:schemeClr val="accent1"/>
+          </a:effectRef>
+          <a:fontRef idx="minor">
+            <a:schemeClr val="lt1"/>
+          </a:fontRef>
+        </p:style>
+        <p:txBody>
+          <a:bodyPr rtlCol="0" anchor="ctr"/>
+          <a:lstStyle/>
+          <a:p>
+            <a:pPr algn="ctr"/>
+            <a:endParaRPr lang="it-IT" sz="1100" b="1" dirty="0">
+              <a:solidFill>
+                <a:schemeClr val="tx1"/>
+              </a:solidFill>
+            </a:endParaRPr>
+          </a:p>
+        </p:txBody>
+      </p:sp>
+      <p:sp>
+        <p:nvSpPr>
+          <p:cNvPr id="129" name="Rettangolo 128">
+            <a:extLst>
+              <a:ext uri="{FF2B5EF4-FFF2-40B4-BE49-F238E27FC236}">
+                <a16:creationId xmlns:a16="http://schemas.microsoft.com/office/drawing/2014/main" id="{1053C4BE-0DD2-9250-D6B5-82AA78AB1B77}"/>
+              </a:ext>
+            </a:extLst>
+          </p:cNvPr>
+          <p:cNvSpPr/>
+          <p:nvPr/>
+        </p:nvSpPr>
+        <p:spPr>
+          <a:xfrm rot="5400000">
+            <a:off x="4855977" y="6341410"/>
+            <a:ext cx="271806" cy="204079"/>
+          </a:xfrm>
+          <a:prstGeom prst="rect">
+            <a:avLst/>
+          </a:prstGeom>
+          <a:solidFill>
+            <a:srgbClr val="0096FF"/>
+          </a:solidFill>
+        </p:spPr>
+        <p:style>
+          <a:lnRef idx="2">
+            <a:schemeClr val="accent1">
+              <a:shade val="15000"/>
+            </a:schemeClr>
+          </a:lnRef>
+          <a:fillRef idx="1">
+            <a:schemeClr val="accent1"/>
+          </a:fillRef>
+          <a:effectRef idx="0">
+            <a:schemeClr val="accent1"/>
+          </a:effectRef>
+          <a:fontRef idx="minor">
+            <a:schemeClr val="lt1"/>
+          </a:fontRef>
+        </p:style>
+        <p:txBody>
+          <a:bodyPr rtlCol="0" anchor="ctr"/>
+          <a:lstStyle/>
+          <a:p>
+            <a:pPr algn="ctr"/>
+            <a:endParaRPr lang="it-IT" sz="1300" b="1" dirty="0">
+              <a:solidFill>
+                <a:schemeClr val="tx1"/>
+              </a:solidFill>
+            </a:endParaRPr>
+          </a:p>
+        </p:txBody>
+      </p:sp>
+      <p:sp>
+        <p:nvSpPr>
+          <p:cNvPr id="130" name="Rettangolo 129">
+            <a:extLst>
+              <a:ext uri="{FF2B5EF4-FFF2-40B4-BE49-F238E27FC236}">
+                <a16:creationId xmlns:a16="http://schemas.microsoft.com/office/drawing/2014/main" id="{AB1D9E65-C384-5EAA-1A0D-AB4C7C160FEB}"/>
+              </a:ext>
+            </a:extLst>
+          </p:cNvPr>
+          <p:cNvSpPr/>
+          <p:nvPr/>
+        </p:nvSpPr>
+        <p:spPr>
+          <a:xfrm rot="5400000">
+            <a:off x="5016800" y="6549855"/>
+            <a:ext cx="181202" cy="158793"/>
+          </a:xfrm>
+          <a:prstGeom prst="rect">
+            <a:avLst/>
+          </a:prstGeom>
+          <a:solidFill>
+            <a:srgbClr val="FFFD78"/>
+          </a:solidFill>
+        </p:spPr>
+        <p:style>
+          <a:lnRef idx="2">
+            <a:schemeClr val="accent1">
+              <a:shade val="15000"/>
+            </a:schemeClr>
+          </a:lnRef>
+          <a:fillRef idx="1">
+            <a:schemeClr val="accent1"/>
+          </a:fillRef>
+          <a:effectRef idx="0">
+            <a:schemeClr val="accent1"/>
+          </a:effectRef>
+          <a:fontRef idx="minor">
+            <a:schemeClr val="lt1"/>
+          </a:fontRef>
+        </p:style>
+        <p:txBody>
+          <a:bodyPr rtlCol="0" anchor="ctr"/>
+          <a:lstStyle/>
+          <a:p>
+            <a:pPr algn="ctr"/>
+            <a:endParaRPr lang="it-IT" sz="1100" b="1" dirty="0">
+              <a:solidFill>
+                <a:schemeClr val="tx1"/>
+              </a:solidFill>
+            </a:endParaRPr>
+          </a:p>
+        </p:txBody>
+      </p:sp>
+      <p:cxnSp>
+        <p:nvCxnSpPr>
+          <p:cNvPr id="2" name="Connettore 2 1">
+            <a:extLst>
+              <a:ext uri="{FF2B5EF4-FFF2-40B4-BE49-F238E27FC236}">
+                <a16:creationId xmlns:a16="http://schemas.microsoft.com/office/drawing/2014/main" id="{0C6EAC2F-F29F-5E02-2BDA-CD6295DF3038}"/>
+              </a:ext>
+            </a:extLst>
+          </p:cNvPr>
+          <p:cNvCxnSpPr>
+            <a:cxnSpLocks/>
+            <a:stCxn id="74" idx="2"/>
+            <a:endCxn id="6" idx="0"/>
+          </p:cNvCxnSpPr>
+          <p:nvPr/>
+        </p:nvCxnSpPr>
+        <p:spPr>
+          <a:xfrm flipH="1">
+            <a:off x="351937" y="2356077"/>
+            <a:ext cx="681049" cy="143969"/>
+          </a:xfrm>
+          <a:prstGeom prst="straightConnector1">
+            <a:avLst/>
+          </a:prstGeom>
+          <a:ln w="25400" cmpd="sng">
+            <a:tailEnd type="triangle"/>
+          </a:ln>
+        </p:spPr>
+        <p:style>
+          <a:lnRef idx="2">
+            <a:schemeClr val="dk1"/>
+          </a:lnRef>
+          <a:fillRef idx="0">
+            <a:schemeClr val="dk1"/>
+          </a:fillRef>
+          <a:effectRef idx="1">
+            <a:schemeClr val="dk1"/>
+          </a:effectRef>
+          <a:fontRef idx="minor">
+            <a:schemeClr val="tx1"/>
+          </a:fontRef>
+        </p:style>
+      </p:cxnSp>
+      <p:sp>
+        <p:nvSpPr>
+          <p:cNvPr id="6" name="Rettangolo 5">
+            <a:extLst>
+              <a:ext uri="{FF2B5EF4-FFF2-40B4-BE49-F238E27FC236}">
+                <a16:creationId xmlns:a16="http://schemas.microsoft.com/office/drawing/2014/main" id="{C757137D-7654-E72F-CC4E-C936CA6225DC}"/>
+              </a:ext>
+            </a:extLst>
+          </p:cNvPr>
+          <p:cNvSpPr/>
+          <p:nvPr/>
+        </p:nvSpPr>
+        <p:spPr>
+          <a:xfrm rot="2206751">
+            <a:off x="-213661" y="2471814"/>
+            <a:ext cx="961359" cy="283658"/>
+          </a:xfrm>
+          <a:prstGeom prst="rect">
+            <a:avLst/>
+          </a:prstGeom>
+          <a:solidFill>
+            <a:schemeClr val="bg1">
+              <a:lumMod val="85000"/>
+            </a:schemeClr>
+          </a:solidFill>
+        </p:spPr>
+        <p:style>
+          <a:lnRef idx="2">
+            <a:schemeClr val="accent1">
+              <a:shade val="15000"/>
+            </a:schemeClr>
+          </a:lnRef>
+          <a:fillRef idx="1">
+            <a:schemeClr val="accent1"/>
+          </a:fillRef>
+          <a:effectRef idx="0">
+            <a:schemeClr val="accent1"/>
+          </a:effectRef>
+          <a:fontRef idx="minor">
+            <a:schemeClr val="lt1"/>
+          </a:fontRef>
+        </p:style>
+        <p:txBody>
+          <a:bodyPr rtlCol="0" anchor="ctr"/>
+          <a:lstStyle/>
+          <a:p>
+            <a:pPr algn="ctr"/>
+            <a:r>
+              <a:rPr lang="it-IT" sz="800" dirty="0">
+                <a:solidFill>
+                  <a:schemeClr val="tx1"/>
+                </a:solidFill>
+              </a:rPr>
+              <a:t>CONCATENATE</a:t>
+            </a:r>
+          </a:p>
+        </p:txBody>
+      </p:sp>
+      <p:cxnSp>
+        <p:nvCxnSpPr>
+          <p:cNvPr id="9" name="Connettore 2 8">
+            <a:extLst>
+              <a:ext uri="{FF2B5EF4-FFF2-40B4-BE49-F238E27FC236}">
+                <a16:creationId xmlns:a16="http://schemas.microsoft.com/office/drawing/2014/main" id="{56F66D57-59E8-0A50-A3AD-C2732537675C}"/>
+              </a:ext>
+            </a:extLst>
+          </p:cNvPr>
+          <p:cNvCxnSpPr>
+            <a:cxnSpLocks/>
+            <a:stCxn id="6" idx="2"/>
+            <a:endCxn id="73" idx="0"/>
+          </p:cNvCxnSpPr>
+          <p:nvPr/>
+        </p:nvCxnSpPr>
+        <p:spPr>
+          <a:xfrm>
+            <a:off x="182101" y="2727241"/>
+            <a:ext cx="120385" cy="236028"/>
+          </a:xfrm>
+          <a:prstGeom prst="straightConnector1">
+            <a:avLst/>
+          </a:prstGeom>
+          <a:ln w="25400" cmpd="sng">
+            <a:tailEnd type="triangle"/>
+          </a:ln>
+        </p:spPr>
+        <p:style>
+          <a:lnRef idx="2">
+            <a:schemeClr val="dk1"/>
+          </a:lnRef>
+          <a:fillRef idx="0">
+            <a:schemeClr val="dk1"/>
+          </a:fillRef>
+          <a:effectRef idx="1">
+            <a:schemeClr val="dk1"/>
+          </a:effectRef>
+          <a:fontRef idx="minor">
+            <a:schemeClr val="tx1"/>
+          </a:fontRef>
+        </p:style>
+      </p:cxnSp>
+      <p:sp>
+        <p:nvSpPr>
+          <p:cNvPr id="21" name="Rettangolo 20">
+            <a:extLst>
+              <a:ext uri="{FF2B5EF4-FFF2-40B4-BE49-F238E27FC236}">
+                <a16:creationId xmlns:a16="http://schemas.microsoft.com/office/drawing/2014/main" id="{4D4E6D9E-E8BE-9405-48F2-58F1FE978F89}"/>
+              </a:ext>
+            </a:extLst>
+          </p:cNvPr>
+          <p:cNvSpPr/>
+          <p:nvPr/>
+        </p:nvSpPr>
+        <p:spPr>
+          <a:xfrm>
+            <a:off x="1679837" y="5144272"/>
+            <a:ext cx="821318" cy="148509"/>
+          </a:xfrm>
+          <a:prstGeom prst="rect">
+            <a:avLst/>
+          </a:prstGeom>
+          <a:solidFill>
+            <a:schemeClr val="accent2"/>
+          </a:solidFill>
+        </p:spPr>
+        <p:style>
+          <a:lnRef idx="2">
+            <a:schemeClr val="accent1">
+              <a:shade val="15000"/>
+            </a:schemeClr>
+          </a:lnRef>
+          <a:fillRef idx="1">
+            <a:schemeClr val="accent1"/>
+          </a:fillRef>
+          <a:effectRef idx="0">
+            <a:schemeClr val="accent1"/>
+          </a:effectRef>
+          <a:fontRef idx="minor">
+            <a:schemeClr val="lt1"/>
+          </a:fontRef>
+        </p:style>
+        <p:txBody>
+          <a:bodyPr rtlCol="0" anchor="ctr"/>
+          <a:lstStyle/>
+          <a:p>
+            <a:pPr algn="ctr"/>
+            <a:r>
+              <a:rPr lang="it-IT" sz="1300" b="1" dirty="0">
+                <a:solidFill>
+                  <a:schemeClr val="tx1"/>
+                </a:solidFill>
+              </a:rPr>
+              <a:t>Conv2D</a:t>
+            </a:r>
+          </a:p>
+        </p:txBody>
+      </p:sp>
+    </p:spTree>
+    <p:extLst>
+      <p:ext uri="{BB962C8B-B14F-4D97-AF65-F5344CB8AC3E}">
+        <p14:creationId xmlns:p14="http://schemas.microsoft.com/office/powerpoint/2010/main" val="2320230294"/>
       </p:ext>
     </p:extLst>
   </p:cSld>

</xml_diff>

<commit_message>
completed multihead first trial architecture
</commit_message>
<xml_diff>
--- a/models_representation.pptx
+++ b/models_representation.pptx
@@ -6723,7 +6723,7 @@
         </p:nvSpPr>
         <p:spPr>
           <a:xfrm rot="5400000">
-            <a:off x="9545860" y="2920815"/>
+            <a:off x="9772111" y="2920816"/>
             <a:ext cx="1887799" cy="233402"/>
           </a:xfrm>
           <a:prstGeom prst="rect">
@@ -6782,7 +6782,7 @@
         </p:nvSpPr>
         <p:spPr>
           <a:xfrm rot="5400000">
-            <a:off x="10313296" y="3066324"/>
+            <a:off x="10478936" y="3066325"/>
             <a:ext cx="1887799" cy="233402"/>
           </a:xfrm>
           <a:prstGeom prst="rect">
@@ -6839,14 +6839,14 @@
           <p:cNvCxnSpPr>
             <a:cxnSpLocks/>
             <a:stCxn id="245" idx="3"/>
-            <a:endCxn id="248" idx="2"/>
+            <a:endCxn id="64" idx="2"/>
           </p:cNvCxnSpPr>
           <p:nvPr/>
         </p:nvCxnSpPr>
         <p:spPr>
           <a:xfrm flipV="1">
-            <a:off x="10139656" y="3037517"/>
-            <a:ext cx="233403" cy="72335"/>
+            <a:off x="10139656" y="3057160"/>
+            <a:ext cx="176245" cy="52692"/>
           </a:xfrm>
           <a:prstGeom prst="straightConnector1">
             <a:avLst/>
@@ -6885,14 +6885,14 @@
           <p:cNvCxnSpPr>
             <a:cxnSpLocks/>
             <a:stCxn id="248" idx="0"/>
-            <a:endCxn id="249" idx="2"/>
+            <a:endCxn id="92" idx="2"/>
           </p:cNvCxnSpPr>
           <p:nvPr/>
         </p:nvCxnSpPr>
         <p:spPr>
           <a:xfrm>
-            <a:off x="10606461" y="3037517"/>
-            <a:ext cx="534034" cy="145509"/>
+            <a:off x="10832712" y="3037518"/>
+            <a:ext cx="158912" cy="68978"/>
           </a:xfrm>
           <a:prstGeom prst="straightConnector1">
             <a:avLst/>
@@ -6936,7 +6936,7 @@
         </p:nvCxnSpPr>
         <p:spPr>
           <a:xfrm flipH="1">
-            <a:off x="10489760" y="1355685"/>
+            <a:off x="10716011" y="1355686"/>
             <a:ext cx="193962" cy="737932"/>
           </a:xfrm>
           <a:prstGeom prst="straightConnector1">
@@ -6978,7 +6978,7 @@
         </p:nvCxnSpPr>
         <p:spPr>
           <a:xfrm flipH="1">
-            <a:off x="11257196" y="1350149"/>
+            <a:off x="11422836" y="1350150"/>
             <a:ext cx="420430" cy="888977"/>
           </a:xfrm>
           <a:prstGeom prst="straightConnector1">
@@ -7014,17 +7014,19 @@
           </p:cNvPr>
           <p:cNvCxnSpPr>
             <a:cxnSpLocks/>
+            <a:stCxn id="64" idx="1"/>
+            <a:endCxn id="248" idx="1"/>
           </p:cNvCxnSpPr>
           <p:nvPr/>
         </p:nvCxnSpPr>
         <p:spPr>
-          <a:xfrm>
-            <a:off x="10161090" y="1827663"/>
-            <a:ext cx="338556" cy="292091"/>
+          <a:xfrm rot="5400000" flipH="1" flipV="1">
+            <a:off x="10370768" y="2126815"/>
+            <a:ext cx="378440" cy="312046"/>
           </a:xfrm>
           <a:prstGeom prst="bentConnector3">
             <a:avLst>
-              <a:gd name="adj1" fmla="val 101798"/>
+              <a:gd name="adj1" fmla="val 194308"/>
             </a:avLst>
           </a:prstGeom>
           <a:ln>
@@ -7060,17 +7062,20 @@
           </p:cNvPr>
           <p:cNvCxnSpPr>
             <a:cxnSpLocks/>
+            <a:stCxn id="92" idx="1"/>
             <a:endCxn id="249" idx="1"/>
           </p:cNvCxnSpPr>
           <p:nvPr/>
         </p:nvCxnSpPr>
         <p:spPr>
-          <a:xfrm>
-            <a:off x="10625114" y="2135452"/>
-            <a:ext cx="632082" cy="103674"/>
-          </a:xfrm>
-          <a:prstGeom prst="bentConnector2">
-            <a:avLst/>
+          <a:xfrm rot="5400000" flipH="1" flipV="1">
+            <a:off x="11110129" y="2208687"/>
+            <a:ext cx="282267" cy="343148"/>
+          </a:xfrm>
+          <a:prstGeom prst="bentConnector3">
+            <a:avLst>
+              <a:gd name="adj1" fmla="val 253851"/>
+            </a:avLst>
           </a:prstGeom>
           <a:ln>
             <a:solidFill>
@@ -7112,12 +7117,12 @@
         </p:nvCxnSpPr>
         <p:spPr>
           <a:xfrm rot="5400000" flipH="1" flipV="1">
-            <a:off x="7741167" y="1303943"/>
-            <a:ext cx="71120" cy="5426065"/>
+            <a:off x="7854293" y="1190819"/>
+            <a:ext cx="71119" cy="5652316"/>
           </a:xfrm>
           <a:prstGeom prst="bentConnector3">
             <a:avLst>
-              <a:gd name="adj1" fmla="val -1743820"/>
+              <a:gd name="adj1" fmla="val -1873717"/>
             </a:avLst>
           </a:prstGeom>
           <a:ln>
@@ -7160,8 +7165,8 @@
         </p:nvCxnSpPr>
         <p:spPr>
           <a:xfrm rot="5400000" flipH="1" flipV="1">
-            <a:off x="7145560" y="336189"/>
-            <a:ext cx="320900" cy="7902371"/>
+            <a:off x="7228380" y="253370"/>
+            <a:ext cx="320899" cy="8068011"/>
           </a:xfrm>
           <a:prstGeom prst="bentConnector3">
             <a:avLst>
@@ -7264,8 +7269,8 @@
         </p:nvCxnSpPr>
         <p:spPr>
           <a:xfrm>
-            <a:off x="11373897" y="3183026"/>
-            <a:ext cx="303730" cy="19938"/>
+            <a:off x="11539537" y="3183027"/>
+            <a:ext cx="138090" cy="19937"/>
           </a:xfrm>
           <a:prstGeom prst="straightConnector1">
             <a:avLst/>
@@ -8137,6 +8142,223 @@
           </a:fillRef>
           <a:effectRef idx="1">
             <a:schemeClr val="dk1"/>
+          </a:effectRef>
+          <a:fontRef idx="minor">
+            <a:schemeClr val="tx1"/>
+          </a:fontRef>
+        </p:style>
+      </p:cxnSp>
+      <p:sp>
+        <p:nvSpPr>
+          <p:cNvPr id="64" name="Rettangolo 63">
+            <a:extLst>
+              <a:ext uri="{FF2B5EF4-FFF2-40B4-BE49-F238E27FC236}">
+                <a16:creationId xmlns:a16="http://schemas.microsoft.com/office/drawing/2014/main" id="{4CDABF36-6012-7A6B-9043-96F5662C8DF0}"/>
+              </a:ext>
+            </a:extLst>
+          </p:cNvPr>
+          <p:cNvSpPr/>
+          <p:nvPr/>
+        </p:nvSpPr>
+        <p:spPr>
+          <a:xfrm rot="5460164">
+            <a:off x="9807146" y="2980711"/>
+            <a:ext cx="1173108" cy="155622"/>
+          </a:xfrm>
+          <a:prstGeom prst="rect">
+            <a:avLst/>
+          </a:prstGeom>
+          <a:solidFill>
+            <a:schemeClr val="accent5">
+              <a:lumMod val="60000"/>
+              <a:lumOff val="40000"/>
+            </a:schemeClr>
+          </a:solidFill>
+        </p:spPr>
+        <p:style>
+          <a:lnRef idx="2">
+            <a:schemeClr val="accent1">
+              <a:shade val="15000"/>
+            </a:schemeClr>
+          </a:lnRef>
+          <a:fillRef idx="1">
+            <a:schemeClr val="accent1"/>
+          </a:fillRef>
+          <a:effectRef idx="0">
+            <a:schemeClr val="accent1"/>
+          </a:effectRef>
+          <a:fontRef idx="minor">
+            <a:schemeClr val="lt1"/>
+          </a:fontRef>
+        </p:style>
+        <p:txBody>
+          <a:bodyPr rtlCol="0" anchor="ctr"/>
+          <a:lstStyle/>
+          <a:p>
+            <a:pPr algn="ctr"/>
+            <a:r>
+              <a:rPr lang="it-IT" sz="1300" dirty="0" err="1">
+                <a:solidFill>
+                  <a:schemeClr val="tx1"/>
+                </a:solidFill>
+              </a:rPr>
+              <a:t>Interpolation</a:t>
+            </a:r>
+            <a:endParaRPr lang="it-IT" sz="1300" dirty="0">
+              <a:solidFill>
+                <a:schemeClr val="tx1"/>
+              </a:solidFill>
+            </a:endParaRPr>
+          </a:p>
+        </p:txBody>
+      </p:sp>
+      <p:cxnSp>
+        <p:nvCxnSpPr>
+          <p:cNvPr id="87" name="Connettore 2 86">
+            <a:extLst>
+              <a:ext uri="{FF2B5EF4-FFF2-40B4-BE49-F238E27FC236}">
+                <a16:creationId xmlns:a16="http://schemas.microsoft.com/office/drawing/2014/main" id="{12CD70B1-52CE-0B68-09E2-0EBD495FAA9E}"/>
+              </a:ext>
+            </a:extLst>
+          </p:cNvPr>
+          <p:cNvCxnSpPr>
+            <a:cxnSpLocks/>
+            <a:stCxn id="64" idx="0"/>
+            <a:endCxn id="248" idx="2"/>
+          </p:cNvCxnSpPr>
+          <p:nvPr/>
+        </p:nvCxnSpPr>
+        <p:spPr>
+          <a:xfrm flipV="1">
+            <a:off x="10471499" y="3037518"/>
+            <a:ext cx="127811" cy="22366"/>
+          </a:xfrm>
+          <a:prstGeom prst="straightConnector1">
+            <a:avLst/>
+          </a:prstGeom>
+          <a:ln>
+            <a:tailEnd type="triangle"/>
+          </a:ln>
+        </p:spPr>
+        <p:style>
+          <a:lnRef idx="2">
+            <a:schemeClr val="dk1"/>
+          </a:lnRef>
+          <a:fillRef idx="0">
+            <a:schemeClr val="dk1"/>
+          </a:fillRef>
+          <a:effectRef idx="1">
+            <a:schemeClr val="dk1"/>
+          </a:effectRef>
+          <a:fontRef idx="minor">
+            <a:schemeClr val="tx1"/>
+          </a:fontRef>
+        </p:style>
+      </p:cxnSp>
+      <p:sp>
+        <p:nvSpPr>
+          <p:cNvPr id="92" name="Rettangolo 91">
+            <a:extLst>
+              <a:ext uri="{FF2B5EF4-FFF2-40B4-BE49-F238E27FC236}">
+                <a16:creationId xmlns:a16="http://schemas.microsoft.com/office/drawing/2014/main" id="{4160A4FB-BDD7-44D9-A5C8-A7D07050E75B}"/>
+              </a:ext>
+            </a:extLst>
+          </p:cNvPr>
+          <p:cNvSpPr/>
+          <p:nvPr/>
+        </p:nvSpPr>
+        <p:spPr>
+          <a:xfrm rot="5460164">
+            <a:off x="10482869" y="3030047"/>
+            <a:ext cx="1173108" cy="155622"/>
+          </a:xfrm>
+          <a:prstGeom prst="rect">
+            <a:avLst/>
+          </a:prstGeom>
+          <a:solidFill>
+            <a:schemeClr val="accent5">
+              <a:lumMod val="60000"/>
+              <a:lumOff val="40000"/>
+            </a:schemeClr>
+          </a:solidFill>
+        </p:spPr>
+        <p:style>
+          <a:lnRef idx="2">
+            <a:schemeClr val="accent1">
+              <a:shade val="15000"/>
+            </a:schemeClr>
+          </a:lnRef>
+          <a:fillRef idx="1">
+            <a:schemeClr val="accent1"/>
+          </a:fillRef>
+          <a:effectRef idx="0">
+            <a:schemeClr val="accent1"/>
+          </a:effectRef>
+          <a:fontRef idx="minor">
+            <a:schemeClr val="lt1"/>
+          </a:fontRef>
+        </p:style>
+        <p:txBody>
+          <a:bodyPr rtlCol="0" anchor="ctr"/>
+          <a:lstStyle/>
+          <a:p>
+            <a:pPr algn="ctr"/>
+            <a:r>
+              <a:rPr lang="it-IT" sz="1300" dirty="0" err="1">
+                <a:solidFill>
+                  <a:schemeClr val="tx1"/>
+                </a:solidFill>
+              </a:rPr>
+              <a:t>Interpolation</a:t>
+            </a:r>
+            <a:endParaRPr lang="it-IT" sz="1300" dirty="0">
+              <a:solidFill>
+                <a:schemeClr val="tx1"/>
+              </a:solidFill>
+            </a:endParaRPr>
+          </a:p>
+        </p:txBody>
+      </p:sp>
+      <p:cxnSp>
+        <p:nvCxnSpPr>
+          <p:cNvPr id="100" name="Connettore 2 99">
+            <a:extLst>
+              <a:ext uri="{FF2B5EF4-FFF2-40B4-BE49-F238E27FC236}">
+                <a16:creationId xmlns:a16="http://schemas.microsoft.com/office/drawing/2014/main" id="{B5409FCF-DFFD-78A1-A605-387C839BC8DE}"/>
+              </a:ext>
+            </a:extLst>
+          </p:cNvPr>
+          <p:cNvCxnSpPr>
+            <a:cxnSpLocks/>
+            <a:stCxn id="92" idx="0"/>
+            <a:endCxn id="249" idx="2"/>
+          </p:cNvCxnSpPr>
+          <p:nvPr/>
+        </p:nvCxnSpPr>
+        <p:spPr>
+          <a:xfrm>
+            <a:off x="11147222" y="3109220"/>
+            <a:ext cx="158913" cy="73807"/>
+          </a:xfrm>
+          <a:prstGeom prst="straightConnector1">
+            <a:avLst/>
+          </a:prstGeom>
+          <a:ln>
+            <a:solidFill>
+              <a:schemeClr val="tx1"/>
+            </a:solidFill>
+            <a:tailEnd type="triangle"/>
+          </a:ln>
+        </p:spPr>
+        <p:style>
+          <a:lnRef idx="2">
+            <a:schemeClr val="accent1"/>
+          </a:lnRef>
+          <a:fillRef idx="0">
+            <a:schemeClr val="accent1"/>
+          </a:fillRef>
+          <a:effectRef idx="1">
+            <a:schemeClr val="accent1"/>
           </a:effectRef>
           <a:fontRef idx="minor">
             <a:schemeClr val="tx1"/>

</xml_diff>